<commit_message>
Materiale presentazione + piccoli fix
</commit_message>
<xml_diff>
--- a/Presentazione.pptx
+++ b/Presentazione.pptx
@@ -119,7 +119,16 @@
       </a:defRPr>
     </a:lvl9pPr>
   </p:defaultTextStyle>
+  <p:extLst>
+    <p:ext uri="{EFAFB233-063F-42B5-8137-9DF3F51BA10A}">
+      <p15:sldGuideLst xmlns:p15="http://schemas.microsoft.com/office/powerpoint/2012/main"/>
+    </p:ext>
+  </p:extLst>
 </p:presentation>
+</file>
+
+<file path=ppt/revisionInfo.xml><?xml version="1.0" encoding="utf-8"?>
+<p1510:revInfo xmlns:a="http://schemas.openxmlformats.org/drawingml/2006/main" xmlns:r="http://schemas.openxmlformats.org/officeDocument/2006/relationships" xmlns:p1510="http://schemas.microsoft.com/office/powerpoint/2015/10/main"/>
 </file>
 
 <file path=ppt/notesMasters/notesMaster1.xml><?xml version="1.0" encoding="utf-8"?>
@@ -204,7 +213,7 @@
           <a:p>
             <a:fld id="{444B84AA-5D7F-044C-A2CA-A90C4BB986C9}" type="datetimeFigureOut">
               <a:rPr lang="it-IT" smtClean="0"/>
-              <a:t>07/09/17</a:t>
+              <a:t>08/09/2017</a:t>
             </a:fld>
             <a:endParaRPr lang="it-IT"/>
           </a:p>
@@ -268,35 +277,35 @@
           <a:p>
             <a:pPr lvl="0"/>
             <a:r>
-              <a:rPr lang="en-US" smtClean="0"/>
+              <a:rPr lang="en-US"/>
               <a:t>Click to edit Master text styles</a:t>
             </a:r>
           </a:p>
           <a:p>
             <a:pPr lvl="1"/>
             <a:r>
-              <a:rPr lang="en-US" smtClean="0"/>
+              <a:rPr lang="en-US"/>
               <a:t>Second level</a:t>
             </a:r>
           </a:p>
           <a:p>
             <a:pPr lvl="2"/>
             <a:r>
-              <a:rPr lang="en-US" smtClean="0"/>
+              <a:rPr lang="en-US"/>
               <a:t>Third level</a:t>
             </a:r>
           </a:p>
           <a:p>
             <a:pPr lvl="3"/>
             <a:r>
-              <a:rPr lang="en-US" smtClean="0"/>
+              <a:rPr lang="en-US"/>
               <a:t>Fourth level</a:t>
             </a:r>
           </a:p>
           <a:p>
             <a:pPr lvl="4"/>
             <a:r>
-              <a:rPr lang="en-US" smtClean="0"/>
+              <a:rPr lang="en-US"/>
               <a:t>Fifth level</a:t>
             </a:r>
             <a:endParaRPr lang="it-IT"/>
@@ -602,7 +611,7 @@
           </a:lstStyle>
           <a:p>
             <a:r>
-              <a:rPr lang="en-US" smtClean="0"/>
+              <a:rPr lang="en-US"/>
               <a:t>Click to edit Master title style</a:t>
             </a:r>
             <a:endParaRPr lang="en-US" dirty="0"/>
@@ -674,7 +683,7 @@
           </a:lstStyle>
           <a:p>
             <a:r>
-              <a:rPr lang="en-US" smtClean="0"/>
+              <a:rPr lang="en-US"/>
               <a:t>Click to edit Master subtitle style</a:t>
             </a:r>
             <a:endParaRPr lang="en-US" dirty="0"/>
@@ -698,7 +707,7 @@
           <a:p>
             <a:fld id="{83CE6F29-DBF2-C24A-928C-69596927030A}" type="datetimeFigureOut">
               <a:rPr lang="en-US" smtClean="0"/>
-              <a:t>9/7/17</a:t>
+              <a:t>9/8/2017</a:t>
             </a:fld>
             <a:endParaRPr lang="en-US"/>
           </a:p>
@@ -825,7 +834,7 @@
           <a:lstStyle/>
           <a:p>
             <a:r>
-              <a:rPr lang="en-US" smtClean="0"/>
+              <a:rPr lang="en-US"/>
               <a:t>Click to edit Master title style</a:t>
             </a:r>
             <a:endParaRPr lang="en-US" dirty="0"/>
@@ -849,35 +858,35 @@
           <a:p>
             <a:pPr lvl="0"/>
             <a:r>
-              <a:rPr lang="en-US" smtClean="0"/>
+              <a:rPr lang="en-US"/>
               <a:t>Click to edit Master text styles</a:t>
             </a:r>
           </a:p>
           <a:p>
             <a:pPr lvl="1"/>
             <a:r>
-              <a:rPr lang="en-US" smtClean="0"/>
+              <a:rPr lang="en-US"/>
               <a:t>Second level</a:t>
             </a:r>
           </a:p>
           <a:p>
             <a:pPr lvl="2"/>
             <a:r>
-              <a:rPr lang="en-US" smtClean="0"/>
+              <a:rPr lang="en-US"/>
               <a:t>Third level</a:t>
             </a:r>
           </a:p>
           <a:p>
             <a:pPr lvl="3"/>
             <a:r>
-              <a:rPr lang="en-US" smtClean="0"/>
+              <a:rPr lang="en-US"/>
               <a:t>Fourth level</a:t>
             </a:r>
           </a:p>
           <a:p>
             <a:pPr lvl="4"/>
             <a:r>
-              <a:rPr lang="en-US" smtClean="0"/>
+              <a:rPr lang="en-US"/>
               <a:t>Fifth level</a:t>
             </a:r>
             <a:endParaRPr lang="en-US" dirty="0"/>
@@ -901,7 +910,7 @@
           <a:p>
             <a:fld id="{83CE6F29-DBF2-C24A-928C-69596927030A}" type="datetimeFigureOut">
               <a:rPr lang="en-US" smtClean="0"/>
-              <a:t>9/7/17</a:t>
+              <a:t>9/8/2017</a:t>
             </a:fld>
             <a:endParaRPr lang="en-US"/>
           </a:p>
@@ -1071,7 +1080,7 @@
           <a:lstStyle/>
           <a:p>
             <a:r>
-              <a:rPr lang="en-US" smtClean="0"/>
+              <a:rPr lang="en-US"/>
               <a:t>Click to edit Master title style</a:t>
             </a:r>
             <a:endParaRPr lang="en-US" dirty="0"/>
@@ -1100,35 +1109,35 @@
           <a:p>
             <a:pPr lvl="0"/>
             <a:r>
-              <a:rPr lang="en-US" smtClean="0"/>
+              <a:rPr lang="en-US"/>
               <a:t>Click to edit Master text styles</a:t>
             </a:r>
           </a:p>
           <a:p>
             <a:pPr lvl="1"/>
             <a:r>
-              <a:rPr lang="en-US" smtClean="0"/>
+              <a:rPr lang="en-US"/>
               <a:t>Second level</a:t>
             </a:r>
           </a:p>
           <a:p>
             <a:pPr lvl="2"/>
             <a:r>
-              <a:rPr lang="en-US" smtClean="0"/>
+              <a:rPr lang="en-US"/>
               <a:t>Third level</a:t>
             </a:r>
           </a:p>
           <a:p>
             <a:pPr lvl="3"/>
             <a:r>
-              <a:rPr lang="en-US" smtClean="0"/>
+              <a:rPr lang="en-US"/>
               <a:t>Fourth level</a:t>
             </a:r>
           </a:p>
           <a:p>
             <a:pPr lvl="4"/>
             <a:r>
-              <a:rPr lang="en-US" smtClean="0"/>
+              <a:rPr lang="en-US"/>
               <a:t>Fifth level</a:t>
             </a:r>
             <a:endParaRPr lang="en-US" dirty="0"/>
@@ -1152,7 +1161,7 @@
           <a:p>
             <a:fld id="{83CE6F29-DBF2-C24A-928C-69596927030A}" type="datetimeFigureOut">
               <a:rPr lang="en-US" smtClean="0"/>
-              <a:t>9/7/17</a:t>
+              <a:t>9/8/2017</a:t>
             </a:fld>
             <a:endParaRPr lang="en-US"/>
           </a:p>
@@ -1241,7 +1250,7 @@
           <a:lstStyle/>
           <a:p>
             <a:r>
-              <a:rPr lang="en-US" smtClean="0"/>
+              <a:rPr lang="en-US"/>
               <a:t>Click to edit Master title style</a:t>
             </a:r>
             <a:endParaRPr lang="en-US" dirty="0"/>
@@ -1265,35 +1274,35 @@
           <a:p>
             <a:pPr lvl="0"/>
             <a:r>
-              <a:rPr lang="en-US" smtClean="0"/>
+              <a:rPr lang="en-US"/>
               <a:t>Click to edit Master text styles</a:t>
             </a:r>
           </a:p>
           <a:p>
             <a:pPr lvl="1"/>
             <a:r>
-              <a:rPr lang="en-US" smtClean="0"/>
+              <a:rPr lang="en-US"/>
               <a:t>Second level</a:t>
             </a:r>
           </a:p>
           <a:p>
             <a:pPr lvl="2"/>
             <a:r>
-              <a:rPr lang="en-US" smtClean="0"/>
+              <a:rPr lang="en-US"/>
               <a:t>Third level</a:t>
             </a:r>
           </a:p>
           <a:p>
             <a:pPr lvl="3"/>
             <a:r>
-              <a:rPr lang="en-US" smtClean="0"/>
+              <a:rPr lang="en-US"/>
               <a:t>Fourth level</a:t>
             </a:r>
           </a:p>
           <a:p>
             <a:pPr lvl="4"/>
             <a:r>
-              <a:rPr lang="en-US" smtClean="0"/>
+              <a:rPr lang="en-US"/>
               <a:t>Fifth level</a:t>
             </a:r>
             <a:endParaRPr lang="en-US" dirty="0"/>
@@ -1317,7 +1326,7 @@
           <a:p>
             <a:fld id="{83CE6F29-DBF2-C24A-928C-69596927030A}" type="datetimeFigureOut">
               <a:rPr lang="en-US" smtClean="0"/>
-              <a:t>9/7/17</a:t>
+              <a:t>9/8/2017</a:t>
             </a:fld>
             <a:endParaRPr lang="en-US"/>
           </a:p>
@@ -1511,7 +1520,7 @@
           </a:lstStyle>
           <a:p>
             <a:r>
-              <a:rPr lang="en-US" smtClean="0"/>
+              <a:rPr lang="en-US"/>
               <a:t>Click to edit Master title style</a:t>
             </a:r>
             <a:endParaRPr lang="en-US" dirty="0"/>
@@ -1632,7 +1641,7 @@
           <a:p>
             <a:pPr lvl="0"/>
             <a:r>
-              <a:rPr lang="en-US" smtClean="0"/>
+              <a:rPr lang="en-US"/>
               <a:t>Click to edit Master text styles</a:t>
             </a:r>
           </a:p>
@@ -1655,7 +1664,7 @@
           <a:p>
             <a:fld id="{83CE6F29-DBF2-C24A-928C-69596927030A}" type="datetimeFigureOut">
               <a:rPr lang="en-US" smtClean="0"/>
-              <a:t>9/7/17</a:t>
+              <a:t>9/8/2017</a:t>
             </a:fld>
             <a:endParaRPr lang="en-US"/>
           </a:p>
@@ -1787,7 +1796,7 @@
           <a:lstStyle/>
           <a:p>
             <a:r>
-              <a:rPr lang="en-US" smtClean="0"/>
+              <a:rPr lang="en-US"/>
               <a:t>Click to edit Master title style</a:t>
             </a:r>
             <a:endParaRPr lang="en-US" dirty="0"/>
@@ -1816,35 +1825,35 @@
           <a:p>
             <a:pPr lvl="0"/>
             <a:r>
-              <a:rPr lang="en-US" smtClean="0"/>
+              <a:rPr lang="en-US"/>
               <a:t>Click to edit Master text styles</a:t>
             </a:r>
           </a:p>
           <a:p>
             <a:pPr lvl="1"/>
             <a:r>
-              <a:rPr lang="en-US" smtClean="0"/>
+              <a:rPr lang="en-US"/>
               <a:t>Second level</a:t>
             </a:r>
           </a:p>
           <a:p>
             <a:pPr lvl="2"/>
             <a:r>
-              <a:rPr lang="en-US" smtClean="0"/>
+              <a:rPr lang="en-US"/>
               <a:t>Third level</a:t>
             </a:r>
           </a:p>
           <a:p>
             <a:pPr lvl="3"/>
             <a:r>
-              <a:rPr lang="en-US" smtClean="0"/>
+              <a:rPr lang="en-US"/>
               <a:t>Fourth level</a:t>
             </a:r>
           </a:p>
           <a:p>
             <a:pPr lvl="4"/>
             <a:r>
-              <a:rPr lang="en-US" smtClean="0"/>
+              <a:rPr lang="en-US"/>
               <a:t>Fifth level</a:t>
             </a:r>
             <a:endParaRPr lang="en-US" dirty="0"/>
@@ -1873,35 +1882,35 @@
           <a:p>
             <a:pPr lvl="0"/>
             <a:r>
-              <a:rPr lang="en-US" smtClean="0"/>
+              <a:rPr lang="en-US"/>
               <a:t>Click to edit Master text styles</a:t>
             </a:r>
           </a:p>
           <a:p>
             <a:pPr lvl="1"/>
             <a:r>
-              <a:rPr lang="en-US" smtClean="0"/>
+              <a:rPr lang="en-US"/>
               <a:t>Second level</a:t>
             </a:r>
           </a:p>
           <a:p>
             <a:pPr lvl="2"/>
             <a:r>
-              <a:rPr lang="en-US" smtClean="0"/>
+              <a:rPr lang="en-US"/>
               <a:t>Third level</a:t>
             </a:r>
           </a:p>
           <a:p>
             <a:pPr lvl="3"/>
             <a:r>
-              <a:rPr lang="en-US" smtClean="0"/>
+              <a:rPr lang="en-US"/>
               <a:t>Fourth level</a:t>
             </a:r>
           </a:p>
           <a:p>
             <a:pPr lvl="4"/>
             <a:r>
-              <a:rPr lang="en-US" smtClean="0"/>
+              <a:rPr lang="en-US"/>
               <a:t>Fifth level</a:t>
             </a:r>
             <a:endParaRPr lang="en-US" dirty="0"/>
@@ -1925,7 +1934,7 @@
           <a:p>
             <a:fld id="{83CE6F29-DBF2-C24A-928C-69596927030A}" type="datetimeFigureOut">
               <a:rPr lang="en-US" smtClean="0"/>
-              <a:t>9/7/17</a:t>
+              <a:t>9/8/2017</a:t>
             </a:fld>
             <a:endParaRPr lang="en-US"/>
           </a:p>
@@ -2019,7 +2028,7 @@
           <a:lstStyle/>
           <a:p>
             <a:r>
-              <a:rPr lang="en-US" smtClean="0"/>
+              <a:rPr lang="en-US"/>
               <a:t>Click to edit Master title style</a:t>
             </a:r>
             <a:endParaRPr lang="en-US" dirty="0"/>
@@ -2091,7 +2100,7 @@
           <a:p>
             <a:pPr lvl="0"/>
             <a:r>
-              <a:rPr lang="en-US" smtClean="0"/>
+              <a:rPr lang="en-US"/>
               <a:t>Click to edit Master text styles</a:t>
             </a:r>
           </a:p>
@@ -2119,35 +2128,35 @@
           <a:p>
             <a:pPr lvl="0"/>
             <a:r>
-              <a:rPr lang="en-US" smtClean="0"/>
+              <a:rPr lang="en-US"/>
               <a:t>Click to edit Master text styles</a:t>
             </a:r>
           </a:p>
           <a:p>
             <a:pPr lvl="1"/>
             <a:r>
-              <a:rPr lang="en-US" smtClean="0"/>
+              <a:rPr lang="en-US"/>
               <a:t>Second level</a:t>
             </a:r>
           </a:p>
           <a:p>
             <a:pPr lvl="2"/>
             <a:r>
-              <a:rPr lang="en-US" smtClean="0"/>
+              <a:rPr lang="en-US"/>
               <a:t>Third level</a:t>
             </a:r>
           </a:p>
           <a:p>
             <a:pPr lvl="3"/>
             <a:r>
-              <a:rPr lang="en-US" smtClean="0"/>
+              <a:rPr lang="en-US"/>
               <a:t>Fourth level</a:t>
             </a:r>
           </a:p>
           <a:p>
             <a:pPr lvl="4"/>
             <a:r>
-              <a:rPr lang="en-US" smtClean="0"/>
+              <a:rPr lang="en-US"/>
               <a:t>Fifth level</a:t>
             </a:r>
             <a:endParaRPr lang="en-US" dirty="0"/>
@@ -2219,7 +2228,7 @@
           <a:p>
             <a:pPr lvl="0"/>
             <a:r>
-              <a:rPr lang="en-US" smtClean="0"/>
+              <a:rPr lang="en-US"/>
               <a:t>Click to edit Master text styles</a:t>
             </a:r>
           </a:p>
@@ -2247,35 +2256,35 @@
           <a:p>
             <a:pPr lvl="0"/>
             <a:r>
-              <a:rPr lang="en-US" smtClean="0"/>
+              <a:rPr lang="en-US"/>
               <a:t>Click to edit Master text styles</a:t>
             </a:r>
           </a:p>
           <a:p>
             <a:pPr lvl="1"/>
             <a:r>
-              <a:rPr lang="en-US" smtClean="0"/>
+              <a:rPr lang="en-US"/>
               <a:t>Second level</a:t>
             </a:r>
           </a:p>
           <a:p>
             <a:pPr lvl="2"/>
             <a:r>
-              <a:rPr lang="en-US" smtClean="0"/>
+              <a:rPr lang="en-US"/>
               <a:t>Third level</a:t>
             </a:r>
           </a:p>
           <a:p>
             <a:pPr lvl="3"/>
             <a:r>
-              <a:rPr lang="en-US" smtClean="0"/>
+              <a:rPr lang="en-US"/>
               <a:t>Fourth level</a:t>
             </a:r>
           </a:p>
           <a:p>
             <a:pPr lvl="4"/>
             <a:r>
-              <a:rPr lang="en-US" smtClean="0"/>
+              <a:rPr lang="en-US"/>
               <a:t>Fifth level</a:t>
             </a:r>
             <a:endParaRPr lang="en-US" dirty="0"/>
@@ -2299,7 +2308,7 @@
           <a:p>
             <a:fld id="{83CE6F29-DBF2-C24A-928C-69596927030A}" type="datetimeFigureOut">
               <a:rPr lang="en-US" smtClean="0"/>
-              <a:t>9/7/17</a:t>
+              <a:t>9/8/2017</a:t>
             </a:fld>
             <a:endParaRPr lang="en-US"/>
           </a:p>
@@ -2388,7 +2397,7 @@
           <a:lstStyle/>
           <a:p>
             <a:r>
-              <a:rPr lang="en-US" smtClean="0"/>
+              <a:rPr lang="en-US"/>
               <a:t>Click to edit Master title style</a:t>
             </a:r>
             <a:endParaRPr lang="en-US" dirty="0"/>
@@ -2412,7 +2421,7 @@
           <a:p>
             <a:fld id="{83CE6F29-DBF2-C24A-928C-69596927030A}" type="datetimeFigureOut">
               <a:rPr lang="en-US" smtClean="0"/>
-              <a:t>9/7/17</a:t>
+              <a:t>9/8/2017</a:t>
             </a:fld>
             <a:endParaRPr lang="en-US"/>
           </a:p>
@@ -2578,7 +2587,7 @@
           <a:p>
             <a:fld id="{83CE6F29-DBF2-C24A-928C-69596927030A}" type="datetimeFigureOut">
               <a:rPr lang="en-US" smtClean="0"/>
-              <a:t>9/7/17</a:t>
+              <a:t>9/8/2017</a:t>
             </a:fld>
             <a:endParaRPr lang="en-US"/>
           </a:p>
@@ -2766,7 +2775,7 @@
           </a:lstStyle>
           <a:p>
             <a:r>
-              <a:rPr lang="en-US" smtClean="0"/>
+              <a:rPr lang="en-US"/>
               <a:t>Click to edit Master title style</a:t>
             </a:r>
             <a:endParaRPr lang="en-US" dirty="0"/>
@@ -2795,35 +2804,35 @@
           <a:p>
             <a:pPr lvl="0"/>
             <a:r>
-              <a:rPr lang="en-US" smtClean="0"/>
+              <a:rPr lang="en-US"/>
               <a:t>Click to edit Master text styles</a:t>
             </a:r>
           </a:p>
           <a:p>
             <a:pPr lvl="1"/>
             <a:r>
-              <a:rPr lang="en-US" smtClean="0"/>
+              <a:rPr lang="en-US"/>
               <a:t>Second level</a:t>
             </a:r>
           </a:p>
           <a:p>
             <a:pPr lvl="2"/>
             <a:r>
-              <a:rPr lang="en-US" smtClean="0"/>
+              <a:rPr lang="en-US"/>
               <a:t>Third level</a:t>
             </a:r>
           </a:p>
           <a:p>
             <a:pPr lvl="3"/>
             <a:r>
-              <a:rPr lang="en-US" smtClean="0"/>
+              <a:rPr lang="en-US"/>
               <a:t>Fourth level</a:t>
             </a:r>
           </a:p>
           <a:p>
             <a:pPr lvl="4"/>
             <a:r>
-              <a:rPr lang="en-US" smtClean="0"/>
+              <a:rPr lang="en-US"/>
               <a:t>Fifth level</a:t>
             </a:r>
             <a:endParaRPr lang="en-US" dirty="0"/>
@@ -2895,7 +2904,7 @@
           <a:p>
             <a:pPr lvl="0"/>
             <a:r>
-              <a:rPr lang="en-US" smtClean="0"/>
+              <a:rPr lang="en-US"/>
               <a:t>Click to edit Master text styles</a:t>
             </a:r>
           </a:p>
@@ -2927,7 +2936,7 @@
           <a:p>
             <a:fld id="{83CE6F29-DBF2-C24A-928C-69596927030A}" type="datetimeFigureOut">
               <a:rPr lang="en-US" smtClean="0"/>
-              <a:t>9/7/17</a:t>
+              <a:t>9/8/2017</a:t>
             </a:fld>
             <a:endParaRPr lang="en-US"/>
           </a:p>
@@ -3128,7 +3137,7 @@
           </a:lstStyle>
           <a:p>
             <a:r>
-              <a:rPr lang="en-US" smtClean="0"/>
+              <a:rPr lang="en-US"/>
               <a:t>Click to edit Master title style</a:t>
             </a:r>
             <a:endParaRPr lang="en-US" dirty="0"/>
@@ -3198,7 +3207,7 @@
           </a:lstStyle>
           <a:p>
             <a:r>
-              <a:rPr lang="en-US" smtClean="0"/>
+              <a:rPr lang="en-US"/>
               <a:t>Drag picture to placeholder or click icon to add</a:t>
             </a:r>
             <a:endParaRPr lang="en-US" dirty="0"/>
@@ -3276,7 +3285,7 @@
           <a:p>
             <a:pPr lvl="0"/>
             <a:r>
-              <a:rPr lang="en-US" smtClean="0"/>
+              <a:rPr lang="en-US"/>
               <a:t>Click to edit Master text styles</a:t>
             </a:r>
           </a:p>
@@ -3299,7 +3308,7 @@
           <a:p>
             <a:fld id="{83CE6F29-DBF2-C24A-928C-69596927030A}" type="datetimeFigureOut">
               <a:rPr lang="en-US" smtClean="0"/>
-              <a:t>9/7/17</a:t>
+              <a:t>9/8/2017</a:t>
             </a:fld>
             <a:endParaRPr lang="en-US"/>
           </a:p>
@@ -3479,7 +3488,7 @@
           <a:lstStyle/>
           <a:p>
             <a:r>
-              <a:rPr lang="en-US" smtClean="0"/>
+              <a:rPr lang="en-US"/>
               <a:t>Click to edit Master title style</a:t>
             </a:r>
             <a:endParaRPr lang="en-US" dirty="0"/>
@@ -3513,35 +3522,35 @@
           <a:p>
             <a:pPr lvl="0"/>
             <a:r>
-              <a:rPr lang="en-US" smtClean="0"/>
+              <a:rPr lang="en-US"/>
               <a:t>Click to edit Master text styles</a:t>
             </a:r>
           </a:p>
           <a:p>
             <a:pPr lvl="1"/>
             <a:r>
-              <a:rPr lang="en-US" smtClean="0"/>
+              <a:rPr lang="en-US"/>
               <a:t>Second level</a:t>
             </a:r>
           </a:p>
           <a:p>
             <a:pPr lvl="2"/>
             <a:r>
-              <a:rPr lang="en-US" smtClean="0"/>
+              <a:rPr lang="en-US"/>
               <a:t>Third level</a:t>
             </a:r>
           </a:p>
           <a:p>
             <a:pPr lvl="3"/>
             <a:r>
-              <a:rPr lang="en-US" smtClean="0"/>
+              <a:rPr lang="en-US"/>
               <a:t>Fourth level</a:t>
             </a:r>
           </a:p>
           <a:p>
             <a:pPr lvl="4"/>
             <a:r>
-              <a:rPr lang="en-US" smtClean="0"/>
+              <a:rPr lang="en-US"/>
               <a:t>Fifth level</a:t>
             </a:r>
             <a:endParaRPr lang="en-US" dirty="0"/>
@@ -3581,7 +3590,7 @@
           <a:p>
             <a:fld id="{83CE6F29-DBF2-C24A-928C-69596927030A}" type="datetimeFigureOut">
               <a:rPr lang="en-US" smtClean="0"/>
-              <a:t>9/7/17</a:t>
+              <a:t>9/8/2017</a:t>
             </a:fld>
             <a:endParaRPr lang="en-US"/>
           </a:p>
@@ -4156,7 +4165,7 @@
           <a:lstStyle/>
           <a:p>
             <a:r>
-              <a:rPr lang="it-IT" dirty="0" err="1" smtClean="0">
+              <a:rPr lang="it-IT" dirty="0" err="1">
                 <a:solidFill>
                   <a:schemeClr val="tx1">
                     <a:lumMod val="65000"/>
@@ -4195,10 +4204,9 @@
           <a:lstStyle/>
           <a:p>
             <a:r>
-              <a:rPr lang="it-IT" dirty="0" smtClean="0"/>
+              <a:rPr lang="it-IT" dirty="0"/>
               <a:t>Ambiente didattico in realtà AUMENTATA PER L’AVVIAMENTO ALLA PROGRAMMAZIONE</a:t>
             </a:r>
-            <a:endParaRPr lang="it-IT" dirty="0"/>
           </a:p>
         </p:txBody>
       </p:sp>
@@ -4225,10 +4233,9 @@
           <a:lstStyle/>
           <a:p>
             <a:r>
-              <a:rPr lang="en-US" smtClean="0"/>
+              <a:rPr lang="en-US"/>
               <a:t>Matteo Boschini</a:t>
             </a:r>
-            <a:endParaRPr lang="en-US"/>
           </a:p>
         </p:txBody>
       </p:sp>
@@ -4242,13 +4249,6 @@
   <p:clrMapOvr>
     <a:masterClrMapping/>
   </p:clrMapOvr>
-  <p:timing>
-    <p:tnLst>
-      <p:par>
-        <p:cTn id="1" dur="indefinite" restart="never" nodeType="tmRoot"/>
-      </p:par>
-    </p:tnLst>
-  </p:timing>
 </p:sld>
 </file>
 
@@ -4285,23 +4285,23 @@
           <a:lstStyle/>
           <a:p>
             <a:r>
-              <a:rPr lang="en-US" dirty="0" err="1" smtClean="0"/>
+              <a:rPr lang="en-US" dirty="0" err="1"/>
               <a:t>Architettura</a:t>
             </a:r>
             <a:r>
-              <a:rPr lang="en-US" dirty="0" smtClean="0"/>
+              <a:rPr lang="en-US" dirty="0"/>
               <a:t> </a:t>
             </a:r>
             <a:r>
-              <a:rPr lang="en-US" dirty="0" err="1" smtClean="0"/>
+              <a:rPr lang="en-US" dirty="0" err="1"/>
               <a:t>dell’ambiente</a:t>
             </a:r>
             <a:r>
-              <a:rPr lang="en-US" dirty="0" smtClean="0"/>
+              <a:rPr lang="en-US" dirty="0"/>
               <a:t> di </a:t>
             </a:r>
             <a:r>
-              <a:rPr lang="en-US" dirty="0" err="1" smtClean="0"/>
+              <a:rPr lang="en-US" dirty="0" err="1"/>
               <a:t>Sviluppo</a:t>
             </a:r>
             <a:endParaRPr lang="en-US" dirty="0"/>
@@ -4354,15 +4354,15 @@
           <a:lstStyle/>
           <a:p>
             <a:r>
-              <a:rPr lang="en-US" dirty="0" err="1" smtClean="0"/>
+              <a:rPr lang="en-US" dirty="0" err="1"/>
               <a:t>Interfaccia</a:t>
             </a:r>
             <a:r>
-              <a:rPr lang="en-US" dirty="0" smtClean="0"/>
+              <a:rPr lang="en-US" dirty="0"/>
               <a:t> </a:t>
             </a:r>
             <a:r>
-              <a:rPr lang="en-US" dirty="0" err="1" smtClean="0"/>
+              <a:rPr lang="en-US" dirty="0" err="1"/>
               <a:t>Grafica</a:t>
             </a:r>
             <a:endParaRPr lang="en-US" dirty="0"/>
@@ -4415,10 +4415,9 @@
           <a:lstStyle/>
           <a:p>
             <a:r>
-              <a:rPr lang="en-US" dirty="0" smtClean="0"/>
+              <a:rPr lang="en-US" dirty="0"/>
               <a:t>Demo</a:t>
             </a:r>
-            <a:endParaRPr lang="en-US" dirty="0"/>
           </a:p>
         </p:txBody>
       </p:sp>
@@ -4468,7 +4467,7 @@
           <a:lstStyle/>
           <a:p>
             <a:r>
-              <a:rPr lang="en-US" dirty="0" err="1" smtClean="0"/>
+              <a:rPr lang="en-US" dirty="0" err="1"/>
               <a:t>Conclusioni</a:t>
             </a:r>
             <a:endParaRPr lang="en-US" dirty="0"/>
@@ -4551,10 +4550,9 @@
           <a:lstStyle/>
           <a:p>
             <a:r>
-              <a:rPr lang="it-IT" dirty="0" smtClean="0"/>
+              <a:rPr lang="it-IT" dirty="0"/>
               <a:t>Finalità</a:t>
             </a:r>
-            <a:endParaRPr lang="it-IT" dirty="0"/>
           </a:p>
         </p:txBody>
       </p:sp>
@@ -4901,27 +4899,19 @@
               <a:buChar char="•"/>
             </a:pPr>
             <a:r>
-              <a:rPr lang="it-IT" sz="2000" b="1" i="1" dirty="0" smtClean="0"/>
+              <a:rPr lang="it-IT" sz="2000" b="1" i="1" dirty="0"/>
               <a:t>Scratch</a:t>
             </a:r>
             <a:r>
               <a:rPr lang="it-IT" sz="2000" dirty="0"/>
-              <a:t> </a:t>
-            </a:r>
-            <a:r>
-              <a:rPr lang="it-IT" sz="2000" dirty="0" smtClean="0"/>
-              <a:t>è un ambiente di sviluppo a fini didattici che fa uso di un </a:t>
-            </a:r>
-            <a:r>
-              <a:rPr lang="it-IT" sz="2000" b="1" dirty="0" err="1" smtClean="0"/>
-              <a:t>linguag-gio</a:t>
-            </a:r>
-            <a:r>
-              <a:rPr lang="it-IT" sz="2000" b="1" dirty="0" smtClean="0"/>
-              <a:t> di programmazione grafico</a:t>
-            </a:r>
-            <a:r>
-              <a:rPr lang="it-IT" sz="2000" dirty="0" smtClean="0"/>
+              <a:t> è un ambiente di sviluppo a fini didattici che fa uso di un </a:t>
+            </a:r>
+            <a:r>
+              <a:rPr lang="it-IT" sz="2000" b="1" dirty="0"/>
+              <a:t>linguaggio di programmazione grafico</a:t>
+            </a:r>
+            <a:r>
+              <a:rPr lang="it-IT" sz="2000" dirty="0"/>
               <a:t> a blocchi.</a:t>
             </a:r>
           </a:p>
@@ -4930,40 +4920,14 @@
               <a:buFont typeface="Arial" charset="0"/>
               <a:buChar char="•"/>
             </a:pPr>
-            <a:endParaRPr lang="it-IT" sz="700" dirty="0" smtClean="0"/>
+            <a:endParaRPr lang="it-IT" sz="700" dirty="0"/>
           </a:p>
           <a:p>
             <a:pPr lvl="1">
               <a:buFont typeface="Arial" charset="0"/>
               <a:buChar char="•"/>
             </a:pPr>
-            <a:r>
-              <a:rPr lang="it-IT" sz="2000" dirty="0" smtClean="0"/>
-              <a:t>La tecnologia di </a:t>
-            </a:r>
-            <a:r>
-              <a:rPr lang="it-IT" sz="2000" b="1" dirty="0" smtClean="0"/>
-              <a:t>realtà virtuale</a:t>
-            </a:r>
-            <a:r>
-              <a:rPr lang="it-IT" sz="2000" dirty="0" smtClean="0"/>
-              <a:t> consente un’</a:t>
-            </a:r>
-            <a:r>
-              <a:rPr lang="it-IT" sz="2000" b="1" dirty="0" smtClean="0"/>
-              <a:t>interazione più intuitiva e naturale</a:t>
-            </a:r>
-            <a:r>
-              <a:rPr lang="it-IT" sz="2000" dirty="0" smtClean="0"/>
-              <a:t> con il calcolatore</a:t>
-            </a:r>
-          </a:p>
-          <a:p>
-            <a:pPr lvl="1">
-              <a:buFont typeface="Arial" charset="0"/>
-              <a:buChar char="•"/>
-            </a:pPr>
-            <a:endParaRPr lang="it-IT" sz="2000" dirty="0" smtClean="0"/>
+            <a:endParaRPr lang="it-IT" sz="2000" dirty="0"/>
           </a:p>
         </p:txBody>
       </p:sp>
@@ -5238,18 +5202,323 @@
               <a:buChar char="•"/>
             </a:pPr>
             <a:r>
-              <a:rPr lang="it-IT" sz="2000" dirty="0" smtClean="0"/>
+              <a:rPr lang="it-IT" sz="2000" dirty="0"/>
               <a:t>La applicazione della seconda al primo </a:t>
             </a:r>
             <a:r>
-              <a:rPr lang="it-IT" sz="2000" b="1" dirty="0" smtClean="0"/>
+              <a:rPr lang="it-IT" sz="2000" b="1" dirty="0"/>
               <a:t>facilita l’interazione</a:t>
             </a:r>
             <a:r>
-              <a:rPr lang="it-IT" sz="2000" dirty="0" smtClean="0"/>
+              <a:rPr lang="it-IT" sz="2000" dirty="0"/>
               <a:t> dell’utente (specie se non abituato alle interfacce classiche).</a:t>
             </a:r>
-            <a:endParaRPr lang="it-IT" sz="2000" dirty="0" smtClean="0"/>
+          </a:p>
+        </p:txBody>
+      </p:sp>
+      <p:sp>
+        <p:nvSpPr>
+          <p:cNvPr id="10" name="Content Placeholder 2">
+            <a:extLst>
+              <a:ext uri="{FF2B5EF4-FFF2-40B4-BE49-F238E27FC236}">
+                <a16:creationId xmlns:a16="http://schemas.microsoft.com/office/drawing/2014/main" id="{5E423904-5B0D-4BD9-B271-FAAC5E33A244}"/>
+              </a:ext>
+            </a:extLst>
+          </p:cNvPr>
+          <p:cNvSpPr txBox="1">
+            <a:spLocks/>
+          </p:cNvSpPr>
+          <p:nvPr/>
+        </p:nvSpPr>
+        <p:spPr>
+          <a:xfrm>
+            <a:off x="4216400" y="3472856"/>
+            <a:ext cx="4150360" cy="1951566"/>
+          </a:xfrm>
+          <a:prstGeom prst="rect">
+            <a:avLst/>
+          </a:prstGeom>
+        </p:spPr>
+        <p:txBody>
+          <a:bodyPr/>
+          <a:lstStyle>
+            <a:lvl1pPr marL="91440" indent="-91440" algn="l" defTabSz="914400" rtl="0" eaLnBrk="1" latinLnBrk="0" hangingPunct="1">
+              <a:lnSpc>
+                <a:spcPct val="90000"/>
+              </a:lnSpc>
+              <a:spcBef>
+                <a:spcPts val="1200"/>
+              </a:spcBef>
+              <a:spcAft>
+                <a:spcPts val="200"/>
+              </a:spcAft>
+              <a:buClr>
+                <a:schemeClr val="accent1"/>
+              </a:buClr>
+              <a:buSzPct val="100000"/>
+              <a:buFont typeface="Calibri" panose="020F0502020204030204" pitchFamily="34" charset="0"/>
+              <a:buChar char=" "/>
+              <a:defRPr sz="2000" kern="1200">
+                <a:solidFill>
+                  <a:schemeClr val="tx1">
+                    <a:lumMod val="75000"/>
+                    <a:lumOff val="25000"/>
+                  </a:schemeClr>
+                </a:solidFill>
+                <a:latin typeface="+mn-lt"/>
+                <a:ea typeface="+mn-ea"/>
+                <a:cs typeface="+mn-cs"/>
+              </a:defRPr>
+            </a:lvl1pPr>
+            <a:lvl2pPr marL="384048" indent="-182880" algn="l" defTabSz="914400" rtl="0" eaLnBrk="1" latinLnBrk="0" hangingPunct="1">
+              <a:lnSpc>
+                <a:spcPct val="90000"/>
+              </a:lnSpc>
+              <a:spcBef>
+                <a:spcPts val="200"/>
+              </a:spcBef>
+              <a:spcAft>
+                <a:spcPts val="400"/>
+              </a:spcAft>
+              <a:buClr>
+                <a:schemeClr val="accent1"/>
+              </a:buClr>
+              <a:buFont typeface="Calibri" pitchFamily="34" charset="0"/>
+              <a:buChar char="◦"/>
+              <a:defRPr sz="1800" kern="1200">
+                <a:solidFill>
+                  <a:schemeClr val="tx1">
+                    <a:lumMod val="75000"/>
+                    <a:lumOff val="25000"/>
+                  </a:schemeClr>
+                </a:solidFill>
+                <a:latin typeface="+mn-lt"/>
+                <a:ea typeface="+mn-ea"/>
+                <a:cs typeface="+mn-cs"/>
+              </a:defRPr>
+            </a:lvl2pPr>
+            <a:lvl3pPr marL="566928" indent="-182880" algn="l" defTabSz="914400" rtl="0" eaLnBrk="1" latinLnBrk="0" hangingPunct="1">
+              <a:lnSpc>
+                <a:spcPct val="90000"/>
+              </a:lnSpc>
+              <a:spcBef>
+                <a:spcPts val="200"/>
+              </a:spcBef>
+              <a:spcAft>
+                <a:spcPts val="400"/>
+              </a:spcAft>
+              <a:buClr>
+                <a:schemeClr val="accent1"/>
+              </a:buClr>
+              <a:buFont typeface="Calibri" pitchFamily="34" charset="0"/>
+              <a:buChar char="◦"/>
+              <a:defRPr sz="1400" kern="1200">
+                <a:solidFill>
+                  <a:schemeClr val="tx1">
+                    <a:lumMod val="75000"/>
+                    <a:lumOff val="25000"/>
+                  </a:schemeClr>
+                </a:solidFill>
+                <a:latin typeface="+mn-lt"/>
+                <a:ea typeface="+mn-ea"/>
+                <a:cs typeface="+mn-cs"/>
+              </a:defRPr>
+            </a:lvl3pPr>
+            <a:lvl4pPr marL="749808" indent="-182880" algn="l" defTabSz="914400" rtl="0" eaLnBrk="1" latinLnBrk="0" hangingPunct="1">
+              <a:lnSpc>
+                <a:spcPct val="90000"/>
+              </a:lnSpc>
+              <a:spcBef>
+                <a:spcPts val="200"/>
+              </a:spcBef>
+              <a:spcAft>
+                <a:spcPts val="400"/>
+              </a:spcAft>
+              <a:buClr>
+                <a:schemeClr val="accent1"/>
+              </a:buClr>
+              <a:buFont typeface="Calibri" pitchFamily="34" charset="0"/>
+              <a:buChar char="◦"/>
+              <a:defRPr sz="1400" kern="1200">
+                <a:solidFill>
+                  <a:schemeClr val="tx1">
+                    <a:lumMod val="75000"/>
+                    <a:lumOff val="25000"/>
+                  </a:schemeClr>
+                </a:solidFill>
+                <a:latin typeface="+mn-lt"/>
+                <a:ea typeface="+mn-ea"/>
+                <a:cs typeface="+mn-cs"/>
+              </a:defRPr>
+            </a:lvl4pPr>
+            <a:lvl5pPr marL="932688" indent="-182880" algn="l" defTabSz="914400" rtl="0" eaLnBrk="1" latinLnBrk="0" hangingPunct="1">
+              <a:lnSpc>
+                <a:spcPct val="90000"/>
+              </a:lnSpc>
+              <a:spcBef>
+                <a:spcPts val="200"/>
+              </a:spcBef>
+              <a:spcAft>
+                <a:spcPts val="400"/>
+              </a:spcAft>
+              <a:buClr>
+                <a:schemeClr val="accent1"/>
+              </a:buClr>
+              <a:buFont typeface="Calibri" pitchFamily="34" charset="0"/>
+              <a:buChar char="◦"/>
+              <a:defRPr sz="1400" kern="1200">
+                <a:solidFill>
+                  <a:schemeClr val="tx1">
+                    <a:lumMod val="75000"/>
+                    <a:lumOff val="25000"/>
+                  </a:schemeClr>
+                </a:solidFill>
+                <a:latin typeface="+mn-lt"/>
+                <a:ea typeface="+mn-ea"/>
+                <a:cs typeface="+mn-cs"/>
+              </a:defRPr>
+            </a:lvl5pPr>
+            <a:lvl6pPr marL="1100000" indent="-228600" algn="l" defTabSz="914400" rtl="0" eaLnBrk="1" latinLnBrk="0" hangingPunct="1">
+              <a:lnSpc>
+                <a:spcPct val="90000"/>
+              </a:lnSpc>
+              <a:spcBef>
+                <a:spcPts val="200"/>
+              </a:spcBef>
+              <a:spcAft>
+                <a:spcPts val="400"/>
+              </a:spcAft>
+              <a:buClr>
+                <a:schemeClr val="accent1"/>
+              </a:buClr>
+              <a:buFont typeface="Calibri" pitchFamily="34" charset="0"/>
+              <a:buChar char="◦"/>
+              <a:defRPr sz="1400" kern="1200">
+                <a:solidFill>
+                  <a:schemeClr val="tx1">
+                    <a:lumMod val="75000"/>
+                    <a:lumOff val="25000"/>
+                  </a:schemeClr>
+                </a:solidFill>
+                <a:latin typeface="+mn-lt"/>
+                <a:ea typeface="+mn-ea"/>
+                <a:cs typeface="+mn-cs"/>
+              </a:defRPr>
+            </a:lvl6pPr>
+            <a:lvl7pPr marL="1300000" indent="-228600" algn="l" defTabSz="914400" rtl="0" eaLnBrk="1" latinLnBrk="0" hangingPunct="1">
+              <a:lnSpc>
+                <a:spcPct val="90000"/>
+              </a:lnSpc>
+              <a:spcBef>
+                <a:spcPts val="200"/>
+              </a:spcBef>
+              <a:spcAft>
+                <a:spcPts val="400"/>
+              </a:spcAft>
+              <a:buClr>
+                <a:schemeClr val="accent1"/>
+              </a:buClr>
+              <a:buFont typeface="Calibri" pitchFamily="34" charset="0"/>
+              <a:buChar char="◦"/>
+              <a:defRPr sz="1400" kern="1200">
+                <a:solidFill>
+                  <a:schemeClr val="tx1">
+                    <a:lumMod val="75000"/>
+                    <a:lumOff val="25000"/>
+                  </a:schemeClr>
+                </a:solidFill>
+                <a:latin typeface="+mn-lt"/>
+                <a:ea typeface="+mn-ea"/>
+                <a:cs typeface="+mn-cs"/>
+              </a:defRPr>
+            </a:lvl7pPr>
+            <a:lvl8pPr marL="1500000" indent="-228600" algn="l" defTabSz="914400" rtl="0" eaLnBrk="1" latinLnBrk="0" hangingPunct="1">
+              <a:lnSpc>
+                <a:spcPct val="90000"/>
+              </a:lnSpc>
+              <a:spcBef>
+                <a:spcPts val="200"/>
+              </a:spcBef>
+              <a:spcAft>
+                <a:spcPts val="400"/>
+              </a:spcAft>
+              <a:buClr>
+                <a:schemeClr val="accent1"/>
+              </a:buClr>
+              <a:buFont typeface="Calibri" pitchFamily="34" charset="0"/>
+              <a:buChar char="◦"/>
+              <a:defRPr sz="1400" kern="1200">
+                <a:solidFill>
+                  <a:schemeClr val="tx1">
+                    <a:lumMod val="75000"/>
+                    <a:lumOff val="25000"/>
+                  </a:schemeClr>
+                </a:solidFill>
+                <a:latin typeface="+mn-lt"/>
+                <a:ea typeface="+mn-ea"/>
+                <a:cs typeface="+mn-cs"/>
+              </a:defRPr>
+            </a:lvl8pPr>
+            <a:lvl9pPr marL="1700000" indent="-228600" algn="l" defTabSz="914400" rtl="0" eaLnBrk="1" latinLnBrk="0" hangingPunct="1">
+              <a:lnSpc>
+                <a:spcPct val="90000"/>
+              </a:lnSpc>
+              <a:spcBef>
+                <a:spcPts val="200"/>
+              </a:spcBef>
+              <a:spcAft>
+                <a:spcPts val="400"/>
+              </a:spcAft>
+              <a:buClr>
+                <a:schemeClr val="accent1"/>
+              </a:buClr>
+              <a:buFont typeface="Calibri" pitchFamily="34" charset="0"/>
+              <a:buChar char="◦"/>
+              <a:defRPr sz="1400" kern="1200">
+                <a:solidFill>
+                  <a:schemeClr val="tx1">
+                    <a:lumMod val="75000"/>
+                    <a:lumOff val="25000"/>
+                  </a:schemeClr>
+                </a:solidFill>
+                <a:latin typeface="+mn-lt"/>
+                <a:ea typeface="+mn-ea"/>
+                <a:cs typeface="+mn-cs"/>
+              </a:defRPr>
+            </a:lvl9pPr>
+          </a:lstStyle>
+          <a:p>
+            <a:pPr lvl="1">
+              <a:buFont typeface="Arial" charset="0"/>
+              <a:buChar char="•"/>
+            </a:pPr>
+            <a:r>
+              <a:rPr lang="it-IT" sz="2000" dirty="0"/>
+              <a:t>La tecnologia di </a:t>
+            </a:r>
+            <a:r>
+              <a:rPr lang="it-IT" sz="2000" b="1" dirty="0"/>
+              <a:t>realtà virtuale</a:t>
+            </a:r>
+            <a:r>
+              <a:rPr lang="it-IT" sz="2000" dirty="0"/>
+              <a:t> consente un’</a:t>
+            </a:r>
+            <a:r>
+              <a:rPr lang="it-IT" sz="2000" b="1" dirty="0"/>
+              <a:t>interazione più intuitiva e naturale</a:t>
+            </a:r>
+            <a:r>
+              <a:rPr lang="it-IT" sz="2000" dirty="0"/>
+              <a:t> con il calcolatore</a:t>
+            </a:r>
+          </a:p>
+          <a:p>
+            <a:pPr lvl="1">
+              <a:buFont typeface="Arial" charset="0"/>
+              <a:buChar char="•"/>
+            </a:pPr>
+            <a:endParaRPr lang="it-IT" sz="2000" dirty="0"/>
           </a:p>
         </p:txBody>
       </p:sp>
@@ -5263,13 +5532,6 @@
   <p:clrMapOvr>
     <a:masterClrMapping/>
   </p:clrMapOvr>
-  <p:timing>
-    <p:tnLst>
-      <p:par>
-        <p:cTn id="1" dur="indefinite" restart="never" nodeType="tmRoot"/>
-      </p:par>
-    </p:tnLst>
-  </p:timing>
 </p:sld>
 </file>
 
@@ -5306,10 +5568,9 @@
           <a:lstStyle/>
           <a:p>
             <a:r>
-              <a:rPr lang="it-IT" dirty="0" smtClean="0"/>
+              <a:rPr lang="it-IT" dirty="0"/>
               <a:t>Obiettivi</a:t>
             </a:r>
-            <a:endParaRPr lang="it-IT" dirty="0"/>
           </a:p>
         </p:txBody>
       </p:sp>
@@ -5335,53 +5596,324 @@
               <a:buChar char="•"/>
             </a:pPr>
             <a:r>
-              <a:rPr lang="it-IT" sz="2000" dirty="0" smtClean="0"/>
+              <a:rPr lang="it-IT" sz="2000" dirty="0"/>
               <a:t>Definizione di un linguaggio </a:t>
             </a:r>
             <a:r>
-              <a:rPr lang="it-IT" sz="2000" b="1" dirty="0" smtClean="0"/>
+              <a:rPr lang="it-IT" sz="2000" b="1" dirty="0"/>
               <a:t>grafico</a:t>
             </a:r>
             <a:r>
-              <a:rPr lang="it-IT" sz="2000" dirty="0" smtClean="0"/>
+              <a:rPr lang="it-IT" sz="2000" dirty="0"/>
               <a:t> a </a:t>
             </a:r>
             <a:r>
-              <a:rPr lang="it-IT" sz="2000" b="1" u="sng" dirty="0" smtClean="0"/>
+              <a:rPr lang="it-IT" sz="2000" b="1" u="sng" dirty="0"/>
               <a:t>blocchi</a:t>
             </a:r>
             <a:r>
-              <a:rPr lang="it-IT" sz="2000" dirty="0" smtClean="0"/>
+              <a:rPr lang="it-IT" sz="2000" dirty="0"/>
               <a:t> basato sul paradigma di </a:t>
             </a:r>
             <a:r>
-              <a:rPr lang="it-IT" sz="2000" b="1" dirty="0" smtClean="0"/>
+              <a:rPr lang="it-IT" sz="2000" b="1" dirty="0"/>
               <a:t>programmazione strutturata</a:t>
             </a:r>
             <a:r>
               <a:rPr lang="it-IT" sz="2000" dirty="0"/>
-              <a:t> </a:t>
-            </a:r>
-            <a:r>
-              <a:rPr lang="it-IT" sz="2000" dirty="0" smtClean="0"/>
-              <a:t>con le seguenti caratteristiche:</a:t>
-            </a:r>
-          </a:p>
+              <a:t> con le seguenti caratteristiche:</a:t>
+            </a:r>
+          </a:p>
+        </p:txBody>
+      </p:sp>
+      <p:sp>
+        <p:nvSpPr>
+          <p:cNvPr id="4" name="Content Placeholder 2">
+            <a:extLst>
+              <a:ext uri="{FF2B5EF4-FFF2-40B4-BE49-F238E27FC236}">
+                <a16:creationId xmlns:a16="http://schemas.microsoft.com/office/drawing/2014/main" id="{EBF529E2-29E0-45A6-A2EE-5C0362007B52}"/>
+              </a:ext>
+            </a:extLst>
+          </p:cNvPr>
+          <p:cNvSpPr txBox="1">
+            <a:spLocks/>
+          </p:cNvSpPr>
+          <p:nvPr/>
+        </p:nvSpPr>
+        <p:spPr>
+          <a:xfrm>
+            <a:off x="819440" y="2472919"/>
+            <a:ext cx="7543801" cy="4023360"/>
+          </a:xfrm>
+          <a:prstGeom prst="rect">
+            <a:avLst/>
+          </a:prstGeom>
+        </p:spPr>
+        <p:txBody>
+          <a:bodyPr vert="horz" lIns="0" tIns="45720" rIns="0" bIns="45720" rtlCol="0">
+            <a:normAutofit/>
+          </a:bodyPr>
+          <a:lstStyle>
+            <a:lvl1pPr marL="91440" indent="-91440" algn="l" defTabSz="914400" rtl="0" eaLnBrk="1" latinLnBrk="0" hangingPunct="1">
+              <a:lnSpc>
+                <a:spcPct val="90000"/>
+              </a:lnSpc>
+              <a:spcBef>
+                <a:spcPts val="1200"/>
+              </a:spcBef>
+              <a:spcAft>
+                <a:spcPts val="200"/>
+              </a:spcAft>
+              <a:buClr>
+                <a:schemeClr val="accent1"/>
+              </a:buClr>
+              <a:buSzPct val="100000"/>
+              <a:buFont typeface="Calibri" panose="020F0502020204030204" pitchFamily="34" charset="0"/>
+              <a:buChar char=" "/>
+              <a:defRPr sz="2000" kern="1200">
+                <a:solidFill>
+                  <a:schemeClr val="tx1">
+                    <a:lumMod val="75000"/>
+                    <a:lumOff val="25000"/>
+                  </a:schemeClr>
+                </a:solidFill>
+                <a:latin typeface="+mn-lt"/>
+                <a:ea typeface="+mn-ea"/>
+                <a:cs typeface="+mn-cs"/>
+              </a:defRPr>
+            </a:lvl1pPr>
+            <a:lvl2pPr marL="384048" indent="-182880" algn="l" defTabSz="914400" rtl="0" eaLnBrk="1" latinLnBrk="0" hangingPunct="1">
+              <a:lnSpc>
+                <a:spcPct val="90000"/>
+              </a:lnSpc>
+              <a:spcBef>
+                <a:spcPts val="200"/>
+              </a:spcBef>
+              <a:spcAft>
+                <a:spcPts val="400"/>
+              </a:spcAft>
+              <a:buClr>
+                <a:schemeClr val="accent1"/>
+              </a:buClr>
+              <a:buFont typeface="Calibri" pitchFamily="34" charset="0"/>
+              <a:buChar char="◦"/>
+              <a:defRPr sz="1800" kern="1200">
+                <a:solidFill>
+                  <a:schemeClr val="tx1">
+                    <a:lumMod val="75000"/>
+                    <a:lumOff val="25000"/>
+                  </a:schemeClr>
+                </a:solidFill>
+                <a:latin typeface="+mn-lt"/>
+                <a:ea typeface="+mn-ea"/>
+                <a:cs typeface="+mn-cs"/>
+              </a:defRPr>
+            </a:lvl2pPr>
+            <a:lvl3pPr marL="566928" indent="-182880" algn="l" defTabSz="914400" rtl="0" eaLnBrk="1" latinLnBrk="0" hangingPunct="1">
+              <a:lnSpc>
+                <a:spcPct val="90000"/>
+              </a:lnSpc>
+              <a:spcBef>
+                <a:spcPts val="200"/>
+              </a:spcBef>
+              <a:spcAft>
+                <a:spcPts val="400"/>
+              </a:spcAft>
+              <a:buClr>
+                <a:schemeClr val="accent1"/>
+              </a:buClr>
+              <a:buFont typeface="Calibri" pitchFamily="34" charset="0"/>
+              <a:buChar char="◦"/>
+              <a:defRPr sz="1400" kern="1200">
+                <a:solidFill>
+                  <a:schemeClr val="tx1">
+                    <a:lumMod val="75000"/>
+                    <a:lumOff val="25000"/>
+                  </a:schemeClr>
+                </a:solidFill>
+                <a:latin typeface="+mn-lt"/>
+                <a:ea typeface="+mn-ea"/>
+                <a:cs typeface="+mn-cs"/>
+              </a:defRPr>
+            </a:lvl3pPr>
+            <a:lvl4pPr marL="749808" indent="-182880" algn="l" defTabSz="914400" rtl="0" eaLnBrk="1" latinLnBrk="0" hangingPunct="1">
+              <a:lnSpc>
+                <a:spcPct val="90000"/>
+              </a:lnSpc>
+              <a:spcBef>
+                <a:spcPts val="200"/>
+              </a:spcBef>
+              <a:spcAft>
+                <a:spcPts val="400"/>
+              </a:spcAft>
+              <a:buClr>
+                <a:schemeClr val="accent1"/>
+              </a:buClr>
+              <a:buFont typeface="Calibri" pitchFamily="34" charset="0"/>
+              <a:buChar char="◦"/>
+              <a:defRPr sz="1400" kern="1200">
+                <a:solidFill>
+                  <a:schemeClr val="tx1">
+                    <a:lumMod val="75000"/>
+                    <a:lumOff val="25000"/>
+                  </a:schemeClr>
+                </a:solidFill>
+                <a:latin typeface="+mn-lt"/>
+                <a:ea typeface="+mn-ea"/>
+                <a:cs typeface="+mn-cs"/>
+              </a:defRPr>
+            </a:lvl4pPr>
+            <a:lvl5pPr marL="932688" indent="-182880" algn="l" defTabSz="914400" rtl="0" eaLnBrk="1" latinLnBrk="0" hangingPunct="1">
+              <a:lnSpc>
+                <a:spcPct val="90000"/>
+              </a:lnSpc>
+              <a:spcBef>
+                <a:spcPts val="200"/>
+              </a:spcBef>
+              <a:spcAft>
+                <a:spcPts val="400"/>
+              </a:spcAft>
+              <a:buClr>
+                <a:schemeClr val="accent1"/>
+              </a:buClr>
+              <a:buFont typeface="Calibri" pitchFamily="34" charset="0"/>
+              <a:buChar char="◦"/>
+              <a:defRPr sz="1400" kern="1200">
+                <a:solidFill>
+                  <a:schemeClr val="tx1">
+                    <a:lumMod val="75000"/>
+                    <a:lumOff val="25000"/>
+                  </a:schemeClr>
+                </a:solidFill>
+                <a:latin typeface="+mn-lt"/>
+                <a:ea typeface="+mn-ea"/>
+                <a:cs typeface="+mn-cs"/>
+              </a:defRPr>
+            </a:lvl5pPr>
+            <a:lvl6pPr marL="1100000" indent="-228600" algn="l" defTabSz="914400" rtl="0" eaLnBrk="1" latinLnBrk="0" hangingPunct="1">
+              <a:lnSpc>
+                <a:spcPct val="90000"/>
+              </a:lnSpc>
+              <a:spcBef>
+                <a:spcPts val="200"/>
+              </a:spcBef>
+              <a:spcAft>
+                <a:spcPts val="400"/>
+              </a:spcAft>
+              <a:buClr>
+                <a:schemeClr val="accent1"/>
+              </a:buClr>
+              <a:buFont typeface="Calibri" pitchFamily="34" charset="0"/>
+              <a:buChar char="◦"/>
+              <a:defRPr sz="1400" kern="1200">
+                <a:solidFill>
+                  <a:schemeClr val="tx1">
+                    <a:lumMod val="75000"/>
+                    <a:lumOff val="25000"/>
+                  </a:schemeClr>
+                </a:solidFill>
+                <a:latin typeface="+mn-lt"/>
+                <a:ea typeface="+mn-ea"/>
+                <a:cs typeface="+mn-cs"/>
+              </a:defRPr>
+            </a:lvl6pPr>
+            <a:lvl7pPr marL="1300000" indent="-228600" algn="l" defTabSz="914400" rtl="0" eaLnBrk="1" latinLnBrk="0" hangingPunct="1">
+              <a:lnSpc>
+                <a:spcPct val="90000"/>
+              </a:lnSpc>
+              <a:spcBef>
+                <a:spcPts val="200"/>
+              </a:spcBef>
+              <a:spcAft>
+                <a:spcPts val="400"/>
+              </a:spcAft>
+              <a:buClr>
+                <a:schemeClr val="accent1"/>
+              </a:buClr>
+              <a:buFont typeface="Calibri" pitchFamily="34" charset="0"/>
+              <a:buChar char="◦"/>
+              <a:defRPr sz="1400" kern="1200">
+                <a:solidFill>
+                  <a:schemeClr val="tx1">
+                    <a:lumMod val="75000"/>
+                    <a:lumOff val="25000"/>
+                  </a:schemeClr>
+                </a:solidFill>
+                <a:latin typeface="+mn-lt"/>
+                <a:ea typeface="+mn-ea"/>
+                <a:cs typeface="+mn-cs"/>
+              </a:defRPr>
+            </a:lvl7pPr>
+            <a:lvl8pPr marL="1500000" indent="-228600" algn="l" defTabSz="914400" rtl="0" eaLnBrk="1" latinLnBrk="0" hangingPunct="1">
+              <a:lnSpc>
+                <a:spcPct val="90000"/>
+              </a:lnSpc>
+              <a:spcBef>
+                <a:spcPts val="200"/>
+              </a:spcBef>
+              <a:spcAft>
+                <a:spcPts val="400"/>
+              </a:spcAft>
+              <a:buClr>
+                <a:schemeClr val="accent1"/>
+              </a:buClr>
+              <a:buFont typeface="Calibri" pitchFamily="34" charset="0"/>
+              <a:buChar char="◦"/>
+              <a:defRPr sz="1400" kern="1200">
+                <a:solidFill>
+                  <a:schemeClr val="tx1">
+                    <a:lumMod val="75000"/>
+                    <a:lumOff val="25000"/>
+                  </a:schemeClr>
+                </a:solidFill>
+                <a:latin typeface="+mn-lt"/>
+                <a:ea typeface="+mn-ea"/>
+                <a:cs typeface="+mn-cs"/>
+              </a:defRPr>
+            </a:lvl8pPr>
+            <a:lvl9pPr marL="1700000" indent="-228600" algn="l" defTabSz="914400" rtl="0" eaLnBrk="1" latinLnBrk="0" hangingPunct="1">
+              <a:lnSpc>
+                <a:spcPct val="90000"/>
+              </a:lnSpc>
+              <a:spcBef>
+                <a:spcPts val="200"/>
+              </a:spcBef>
+              <a:spcAft>
+                <a:spcPts val="400"/>
+              </a:spcAft>
+              <a:buClr>
+                <a:schemeClr val="accent1"/>
+              </a:buClr>
+              <a:buFont typeface="Calibri" pitchFamily="34" charset="0"/>
+              <a:buChar char="◦"/>
+              <a:defRPr sz="1400" kern="1200">
+                <a:solidFill>
+                  <a:schemeClr val="tx1">
+                    <a:lumMod val="75000"/>
+                    <a:lumOff val="25000"/>
+                  </a:schemeClr>
+                </a:solidFill>
+                <a:latin typeface="+mn-lt"/>
+                <a:ea typeface="+mn-ea"/>
+                <a:cs typeface="+mn-cs"/>
+              </a:defRPr>
+            </a:lvl9pPr>
+          </a:lstStyle>
           <a:p>
             <a:pPr lvl="2">
               <a:buFont typeface="Arial" charset="0"/>
               <a:buChar char="•"/>
             </a:pPr>
             <a:r>
-              <a:rPr lang="it-IT" sz="1600" dirty="0" smtClean="0"/>
+              <a:rPr lang="it-IT" sz="1600" dirty="0"/>
               <a:t>Le istruzioni sono rappresentate da </a:t>
             </a:r>
             <a:r>
-              <a:rPr lang="it-IT" sz="1600" b="1" dirty="0" smtClean="0"/>
+              <a:rPr lang="it-IT" sz="1600" b="1" dirty="0"/>
               <a:t>blocchi componibili </a:t>
             </a:r>
             <a:r>
-              <a:rPr lang="it-IT" sz="1600" dirty="0" smtClean="0"/>
+              <a:rPr lang="it-IT" sz="1600" dirty="0"/>
               <a:t>in script.</a:t>
             </a:r>
           </a:p>
@@ -5391,7 +5923,7 @@
               <a:buChar char="•"/>
             </a:pPr>
             <a:r>
-              <a:rPr lang="it-IT" sz="1600" dirty="0" smtClean="0"/>
+              <a:rPr lang="it-IT" sz="1600" dirty="0"/>
               <a:t>Blocchi speciali con </a:t>
             </a:r>
             <a:r>
@@ -5399,15 +5931,15 @@
               <a:t>forme intuitive</a:t>
             </a:r>
             <a:r>
-              <a:rPr lang="it-IT" sz="1600" dirty="0" smtClean="0"/>
+              <a:rPr lang="it-IT" sz="1600" dirty="0"/>
               <a:t> rappresentano le diverse </a:t>
             </a:r>
             <a:r>
-              <a:rPr lang="it-IT" sz="1600" b="1" dirty="0" smtClean="0"/>
+              <a:rPr lang="it-IT" sz="1600" b="1" dirty="0"/>
               <a:t>strutture di controllo</a:t>
             </a:r>
             <a:r>
-              <a:rPr lang="it-IT" sz="1600" dirty="0" smtClean="0"/>
+              <a:rPr lang="it-IT" sz="1600" dirty="0"/>
               <a:t>.</a:t>
             </a:r>
           </a:p>
@@ -5417,23 +5949,23 @@
               <a:buChar char="•"/>
             </a:pPr>
             <a:r>
-              <a:rPr lang="it-IT" sz="1600" dirty="0" smtClean="0"/>
+              <a:rPr lang="it-IT" sz="1600" dirty="0"/>
               <a:t>Introduzione di </a:t>
             </a:r>
             <a:r>
-              <a:rPr lang="it-IT" sz="1600" b="1" dirty="0" smtClean="0"/>
+              <a:rPr lang="it-IT" sz="1600" b="1" dirty="0"/>
               <a:t>variabili</a:t>
             </a:r>
             <a:r>
-              <a:rPr lang="it-IT" sz="1600" dirty="0" smtClean="0"/>
+              <a:rPr lang="it-IT" sz="1600" dirty="0"/>
               <a:t> ed </a:t>
             </a:r>
             <a:r>
-              <a:rPr lang="it-IT" sz="1600" b="1" dirty="0" smtClean="0"/>
+              <a:rPr lang="it-IT" sz="1600" b="1" dirty="0"/>
               <a:t>espressioni</a:t>
             </a:r>
             <a:r>
-              <a:rPr lang="it-IT" sz="1600" dirty="0" smtClean="0"/>
+              <a:rPr lang="it-IT" sz="1600" dirty="0"/>
               <a:t> di diversi tipi.</a:t>
             </a:r>
           </a:p>
@@ -5443,15 +5975,15 @@
               <a:buChar char="•"/>
             </a:pPr>
             <a:r>
-              <a:rPr lang="it-IT" sz="1600" dirty="0" smtClean="0"/>
+              <a:rPr lang="it-IT" sz="1600" dirty="0"/>
               <a:t>Implementazione un </a:t>
             </a:r>
             <a:r>
-              <a:rPr lang="it-IT" sz="1600" b="1" dirty="0" smtClean="0"/>
+              <a:rPr lang="it-IT" sz="1600" b="1" dirty="0"/>
               <a:t>sistema di trasmissione di messaggi</a:t>
             </a:r>
             <a:r>
-              <a:rPr lang="it-IT" sz="1600" dirty="0" smtClean="0"/>
+              <a:rPr lang="it-IT" sz="1600" dirty="0"/>
               <a:t> per consentire ad una istruzione l’innesco di altri script.</a:t>
             </a:r>
           </a:p>
@@ -5461,15 +5993,15 @@
               <a:buChar char="•"/>
             </a:pPr>
             <a:r>
-              <a:rPr lang="it-IT" sz="1600" dirty="0" smtClean="0"/>
+              <a:rPr lang="it-IT" sz="1600" dirty="0"/>
               <a:t>Possibilità (limitata) di fornire </a:t>
             </a:r>
             <a:r>
-              <a:rPr lang="it-IT" sz="1600" b="1" dirty="0" smtClean="0"/>
+              <a:rPr lang="it-IT" sz="1600" b="1" dirty="0"/>
               <a:t>input</a:t>
             </a:r>
             <a:r>
-              <a:rPr lang="it-IT" sz="1600" dirty="0" smtClean="0"/>
+              <a:rPr lang="it-IT" sz="1600" dirty="0"/>
               <a:t> attraverso i controller VR.</a:t>
             </a:r>
           </a:p>
@@ -5478,24 +6010,306 @@
               <a:buFont typeface="Arial" charset="0"/>
               <a:buChar char="•"/>
             </a:pPr>
-            <a:r>
-              <a:rPr lang="it-IT" sz="2000" dirty="0" smtClean="0"/>
+            <a:endParaRPr lang="it-IT" sz="2000" dirty="0"/>
+          </a:p>
+        </p:txBody>
+      </p:sp>
+      <p:sp>
+        <p:nvSpPr>
+          <p:cNvPr id="5" name="Content Placeholder 2">
+            <a:extLst>
+              <a:ext uri="{FF2B5EF4-FFF2-40B4-BE49-F238E27FC236}">
+                <a16:creationId xmlns:a16="http://schemas.microsoft.com/office/drawing/2014/main" id="{CC034543-9491-44D3-97B3-A015EEF9CFC7}"/>
+              </a:ext>
+            </a:extLst>
+          </p:cNvPr>
+          <p:cNvSpPr txBox="1">
+            <a:spLocks/>
+          </p:cNvSpPr>
+          <p:nvPr/>
+        </p:nvSpPr>
+        <p:spPr>
+          <a:xfrm>
+            <a:off x="826478" y="4162215"/>
+            <a:ext cx="7543801" cy="4023360"/>
+          </a:xfrm>
+          <a:prstGeom prst="rect">
+            <a:avLst/>
+          </a:prstGeom>
+        </p:spPr>
+        <p:txBody>
+          <a:bodyPr vert="horz" lIns="0" tIns="45720" rIns="0" bIns="45720" rtlCol="0">
+            <a:normAutofit/>
+          </a:bodyPr>
+          <a:lstStyle>
+            <a:lvl1pPr marL="91440" indent="-91440" algn="l" defTabSz="914400" rtl="0" eaLnBrk="1" latinLnBrk="0" hangingPunct="1">
+              <a:lnSpc>
+                <a:spcPct val="90000"/>
+              </a:lnSpc>
+              <a:spcBef>
+                <a:spcPts val="1200"/>
+              </a:spcBef>
+              <a:spcAft>
+                <a:spcPts val="200"/>
+              </a:spcAft>
+              <a:buClr>
+                <a:schemeClr val="accent1"/>
+              </a:buClr>
+              <a:buSzPct val="100000"/>
+              <a:buFont typeface="Calibri" panose="020F0502020204030204" pitchFamily="34" charset="0"/>
+              <a:buChar char=" "/>
+              <a:defRPr sz="2000" kern="1200">
+                <a:solidFill>
+                  <a:schemeClr val="tx1">
+                    <a:lumMod val="75000"/>
+                    <a:lumOff val="25000"/>
+                  </a:schemeClr>
+                </a:solidFill>
+                <a:latin typeface="+mn-lt"/>
+                <a:ea typeface="+mn-ea"/>
+                <a:cs typeface="+mn-cs"/>
+              </a:defRPr>
+            </a:lvl1pPr>
+            <a:lvl2pPr marL="384048" indent="-182880" algn="l" defTabSz="914400" rtl="0" eaLnBrk="1" latinLnBrk="0" hangingPunct="1">
+              <a:lnSpc>
+                <a:spcPct val="90000"/>
+              </a:lnSpc>
+              <a:spcBef>
+                <a:spcPts val="200"/>
+              </a:spcBef>
+              <a:spcAft>
+                <a:spcPts val="400"/>
+              </a:spcAft>
+              <a:buClr>
+                <a:schemeClr val="accent1"/>
+              </a:buClr>
+              <a:buFont typeface="Calibri" pitchFamily="34" charset="0"/>
+              <a:buChar char="◦"/>
+              <a:defRPr sz="1800" kern="1200">
+                <a:solidFill>
+                  <a:schemeClr val="tx1">
+                    <a:lumMod val="75000"/>
+                    <a:lumOff val="25000"/>
+                  </a:schemeClr>
+                </a:solidFill>
+                <a:latin typeface="+mn-lt"/>
+                <a:ea typeface="+mn-ea"/>
+                <a:cs typeface="+mn-cs"/>
+              </a:defRPr>
+            </a:lvl2pPr>
+            <a:lvl3pPr marL="566928" indent="-182880" algn="l" defTabSz="914400" rtl="0" eaLnBrk="1" latinLnBrk="0" hangingPunct="1">
+              <a:lnSpc>
+                <a:spcPct val="90000"/>
+              </a:lnSpc>
+              <a:spcBef>
+                <a:spcPts val="200"/>
+              </a:spcBef>
+              <a:spcAft>
+                <a:spcPts val="400"/>
+              </a:spcAft>
+              <a:buClr>
+                <a:schemeClr val="accent1"/>
+              </a:buClr>
+              <a:buFont typeface="Calibri" pitchFamily="34" charset="0"/>
+              <a:buChar char="◦"/>
+              <a:defRPr sz="1400" kern="1200">
+                <a:solidFill>
+                  <a:schemeClr val="tx1">
+                    <a:lumMod val="75000"/>
+                    <a:lumOff val="25000"/>
+                  </a:schemeClr>
+                </a:solidFill>
+                <a:latin typeface="+mn-lt"/>
+                <a:ea typeface="+mn-ea"/>
+                <a:cs typeface="+mn-cs"/>
+              </a:defRPr>
+            </a:lvl3pPr>
+            <a:lvl4pPr marL="749808" indent="-182880" algn="l" defTabSz="914400" rtl="0" eaLnBrk="1" latinLnBrk="0" hangingPunct="1">
+              <a:lnSpc>
+                <a:spcPct val="90000"/>
+              </a:lnSpc>
+              <a:spcBef>
+                <a:spcPts val="200"/>
+              </a:spcBef>
+              <a:spcAft>
+                <a:spcPts val="400"/>
+              </a:spcAft>
+              <a:buClr>
+                <a:schemeClr val="accent1"/>
+              </a:buClr>
+              <a:buFont typeface="Calibri" pitchFamily="34" charset="0"/>
+              <a:buChar char="◦"/>
+              <a:defRPr sz="1400" kern="1200">
+                <a:solidFill>
+                  <a:schemeClr val="tx1">
+                    <a:lumMod val="75000"/>
+                    <a:lumOff val="25000"/>
+                  </a:schemeClr>
+                </a:solidFill>
+                <a:latin typeface="+mn-lt"/>
+                <a:ea typeface="+mn-ea"/>
+                <a:cs typeface="+mn-cs"/>
+              </a:defRPr>
+            </a:lvl4pPr>
+            <a:lvl5pPr marL="932688" indent="-182880" algn="l" defTabSz="914400" rtl="0" eaLnBrk="1" latinLnBrk="0" hangingPunct="1">
+              <a:lnSpc>
+                <a:spcPct val="90000"/>
+              </a:lnSpc>
+              <a:spcBef>
+                <a:spcPts val="200"/>
+              </a:spcBef>
+              <a:spcAft>
+                <a:spcPts val="400"/>
+              </a:spcAft>
+              <a:buClr>
+                <a:schemeClr val="accent1"/>
+              </a:buClr>
+              <a:buFont typeface="Calibri" pitchFamily="34" charset="0"/>
+              <a:buChar char="◦"/>
+              <a:defRPr sz="1400" kern="1200">
+                <a:solidFill>
+                  <a:schemeClr val="tx1">
+                    <a:lumMod val="75000"/>
+                    <a:lumOff val="25000"/>
+                  </a:schemeClr>
+                </a:solidFill>
+                <a:latin typeface="+mn-lt"/>
+                <a:ea typeface="+mn-ea"/>
+                <a:cs typeface="+mn-cs"/>
+              </a:defRPr>
+            </a:lvl5pPr>
+            <a:lvl6pPr marL="1100000" indent="-228600" algn="l" defTabSz="914400" rtl="0" eaLnBrk="1" latinLnBrk="0" hangingPunct="1">
+              <a:lnSpc>
+                <a:spcPct val="90000"/>
+              </a:lnSpc>
+              <a:spcBef>
+                <a:spcPts val="200"/>
+              </a:spcBef>
+              <a:spcAft>
+                <a:spcPts val="400"/>
+              </a:spcAft>
+              <a:buClr>
+                <a:schemeClr val="accent1"/>
+              </a:buClr>
+              <a:buFont typeface="Calibri" pitchFamily="34" charset="0"/>
+              <a:buChar char="◦"/>
+              <a:defRPr sz="1400" kern="1200">
+                <a:solidFill>
+                  <a:schemeClr val="tx1">
+                    <a:lumMod val="75000"/>
+                    <a:lumOff val="25000"/>
+                  </a:schemeClr>
+                </a:solidFill>
+                <a:latin typeface="+mn-lt"/>
+                <a:ea typeface="+mn-ea"/>
+                <a:cs typeface="+mn-cs"/>
+              </a:defRPr>
+            </a:lvl6pPr>
+            <a:lvl7pPr marL="1300000" indent="-228600" algn="l" defTabSz="914400" rtl="0" eaLnBrk="1" latinLnBrk="0" hangingPunct="1">
+              <a:lnSpc>
+                <a:spcPct val="90000"/>
+              </a:lnSpc>
+              <a:spcBef>
+                <a:spcPts val="200"/>
+              </a:spcBef>
+              <a:spcAft>
+                <a:spcPts val="400"/>
+              </a:spcAft>
+              <a:buClr>
+                <a:schemeClr val="accent1"/>
+              </a:buClr>
+              <a:buFont typeface="Calibri" pitchFamily="34" charset="0"/>
+              <a:buChar char="◦"/>
+              <a:defRPr sz="1400" kern="1200">
+                <a:solidFill>
+                  <a:schemeClr val="tx1">
+                    <a:lumMod val="75000"/>
+                    <a:lumOff val="25000"/>
+                  </a:schemeClr>
+                </a:solidFill>
+                <a:latin typeface="+mn-lt"/>
+                <a:ea typeface="+mn-ea"/>
+                <a:cs typeface="+mn-cs"/>
+              </a:defRPr>
+            </a:lvl7pPr>
+            <a:lvl8pPr marL="1500000" indent="-228600" algn="l" defTabSz="914400" rtl="0" eaLnBrk="1" latinLnBrk="0" hangingPunct="1">
+              <a:lnSpc>
+                <a:spcPct val="90000"/>
+              </a:lnSpc>
+              <a:spcBef>
+                <a:spcPts val="200"/>
+              </a:spcBef>
+              <a:spcAft>
+                <a:spcPts val="400"/>
+              </a:spcAft>
+              <a:buClr>
+                <a:schemeClr val="accent1"/>
+              </a:buClr>
+              <a:buFont typeface="Calibri" pitchFamily="34" charset="0"/>
+              <a:buChar char="◦"/>
+              <a:defRPr sz="1400" kern="1200">
+                <a:solidFill>
+                  <a:schemeClr val="tx1">
+                    <a:lumMod val="75000"/>
+                    <a:lumOff val="25000"/>
+                  </a:schemeClr>
+                </a:solidFill>
+                <a:latin typeface="+mn-lt"/>
+                <a:ea typeface="+mn-ea"/>
+                <a:cs typeface="+mn-cs"/>
+              </a:defRPr>
+            </a:lvl8pPr>
+            <a:lvl9pPr marL="1700000" indent="-228600" algn="l" defTabSz="914400" rtl="0" eaLnBrk="1" latinLnBrk="0" hangingPunct="1">
+              <a:lnSpc>
+                <a:spcPct val="90000"/>
+              </a:lnSpc>
+              <a:spcBef>
+                <a:spcPts val="200"/>
+              </a:spcBef>
+              <a:spcAft>
+                <a:spcPts val="400"/>
+              </a:spcAft>
+              <a:buClr>
+                <a:schemeClr val="accent1"/>
+              </a:buClr>
+              <a:buFont typeface="Calibri" pitchFamily="34" charset="0"/>
+              <a:buChar char="◦"/>
+              <a:defRPr sz="1400" kern="1200">
+                <a:solidFill>
+                  <a:schemeClr val="tx1">
+                    <a:lumMod val="75000"/>
+                    <a:lumOff val="25000"/>
+                  </a:schemeClr>
+                </a:solidFill>
+                <a:latin typeface="+mn-lt"/>
+                <a:ea typeface="+mn-ea"/>
+                <a:cs typeface="+mn-cs"/>
+              </a:defRPr>
+            </a:lvl9pPr>
+          </a:lstStyle>
+          <a:p>
+            <a:pPr lvl="1">
+              <a:buFont typeface="Arial" charset="0"/>
+              <a:buChar char="•"/>
+            </a:pPr>
+            <a:r>
+              <a:rPr lang="it-IT" sz="2000" dirty="0"/>
               <a:t>Realizzazione di un </a:t>
             </a:r>
             <a:r>
-              <a:rPr lang="it-IT" sz="2000" b="1" dirty="0" smtClean="0"/>
+              <a:rPr lang="it-IT" sz="2000" b="1" dirty="0"/>
               <a:t>ambiente di sviluppo</a:t>
             </a:r>
             <a:r>
-              <a:rPr lang="it-IT" sz="2000" dirty="0" smtClean="0"/>
+              <a:rPr lang="it-IT" sz="2000" dirty="0"/>
               <a:t>, detto </a:t>
             </a:r>
             <a:r>
-              <a:rPr lang="it-IT" sz="2000" i="1" dirty="0" smtClean="0"/>
+              <a:rPr lang="it-IT" sz="2000" i="1" dirty="0"/>
               <a:t>Playground</a:t>
             </a:r>
             <a:r>
-              <a:rPr lang="it-IT" sz="2000" dirty="0" smtClean="0"/>
+              <a:rPr lang="it-IT" sz="2000" dirty="0"/>
               <a:t>, in cui l’utente può:</a:t>
             </a:r>
           </a:p>
@@ -5505,15 +6319,15 @@
               <a:buChar char="•"/>
             </a:pPr>
             <a:r>
-              <a:rPr lang="it-IT" sz="1600" dirty="0" smtClean="0"/>
+              <a:rPr lang="it-IT" sz="1600" dirty="0"/>
               <a:t>Costruire </a:t>
             </a:r>
             <a:r>
-              <a:rPr lang="it-IT" sz="1600" b="1" dirty="0" smtClean="0"/>
+              <a:rPr lang="it-IT" sz="1600" b="1" dirty="0"/>
               <a:t>script</a:t>
             </a:r>
             <a:r>
-              <a:rPr lang="it-IT" sz="1600" dirty="0" smtClean="0"/>
+              <a:rPr lang="it-IT" sz="1600" dirty="0"/>
               <a:t>.</a:t>
             </a:r>
           </a:p>
@@ -5523,15 +6337,15 @@
               <a:buChar char="•"/>
             </a:pPr>
             <a:r>
-              <a:rPr lang="it-IT" sz="1600" dirty="0" smtClean="0"/>
+              <a:rPr lang="it-IT" sz="1600" dirty="0"/>
               <a:t>Metterli in esecuzione ed osservare i loro effetti su </a:t>
             </a:r>
             <a:r>
-              <a:rPr lang="it-IT" sz="1600" b="1" dirty="0" smtClean="0"/>
+              <a:rPr lang="it-IT" sz="1600" b="1" dirty="0"/>
               <a:t>elementi grafici</a:t>
             </a:r>
             <a:r>
-              <a:rPr lang="it-IT" sz="1600" dirty="0" smtClean="0"/>
+              <a:rPr lang="it-IT" sz="1600" dirty="0"/>
               <a:t>.</a:t>
             </a:r>
           </a:p>
@@ -5540,7 +6354,7 @@
               <a:buFont typeface="Arial" charset="0"/>
               <a:buChar char="•"/>
             </a:pPr>
-            <a:endParaRPr lang="it-IT" sz="2000" dirty="0" smtClean="0"/>
+            <a:endParaRPr lang="it-IT" sz="2000" dirty="0"/>
           </a:p>
         </p:txBody>
       </p:sp>
@@ -5554,13 +6368,6 @@
   <p:clrMapOvr>
     <a:masterClrMapping/>
   </p:clrMapOvr>
-  <p:timing>
-    <p:tnLst>
-      <p:par>
-        <p:cTn id="1" dur="indefinite" restart="never" nodeType="tmRoot"/>
-      </p:par>
-    </p:tnLst>
-  </p:timing>
 </p:sld>
 </file>
 
@@ -5597,10 +6404,9 @@
           <a:lstStyle/>
           <a:p>
             <a:r>
-              <a:rPr lang="it-IT" dirty="0" smtClean="0"/>
+              <a:rPr lang="it-IT" dirty="0"/>
               <a:t>Overview</a:t>
             </a:r>
-            <a:endParaRPr lang="it-IT" dirty="0"/>
           </a:p>
         </p:txBody>
       </p:sp>
@@ -5614,7 +6420,12 @@
             <p:ph idx="1"/>
           </p:nvPr>
         </p:nvSpPr>
-        <p:spPr/>
+        <p:spPr>
+          <a:xfrm>
+            <a:off x="822960" y="1845734"/>
+            <a:ext cx="5595426" cy="4023360"/>
+          </a:xfrm>
+        </p:spPr>
         <p:txBody>
           <a:bodyPr>
             <a:normAutofit/>
@@ -5626,7 +6437,7 @@
               <a:buChar char="•"/>
             </a:pPr>
             <a:r>
-              <a:rPr lang="it-IT" sz="2000" b="1" dirty="0" smtClean="0"/>
+              <a:rPr lang="it-IT" sz="2000" b="1" dirty="0"/>
               <a:t>Playground</a:t>
             </a:r>
           </a:p>
@@ -5636,14 +6447,14 @@
               <a:buChar char="•"/>
             </a:pPr>
             <a:r>
-              <a:rPr lang="it-IT" sz="1600" b="1" dirty="0" smtClean="0"/>
+              <a:rPr lang="it-IT" sz="1600" b="1" dirty="0"/>
               <a:t>Scena</a:t>
             </a:r>
             <a:r>
-              <a:rPr lang="it-IT" sz="1600" dirty="0" smtClean="0"/>
+              <a:rPr lang="it-IT" sz="1600" dirty="0"/>
               <a:t>: uno sfondo statico</a:t>
             </a:r>
-            <a:endParaRPr lang="it-IT" sz="1600" b="1" dirty="0" smtClean="0"/>
+            <a:endParaRPr lang="it-IT" sz="1600" b="1" dirty="0"/>
           </a:p>
           <a:p>
             <a:pPr lvl="2">
@@ -5665,19 +6476,19 @@
               <a:buChar char="•"/>
             </a:pPr>
             <a:r>
-              <a:rPr lang="it-IT" sz="1600" b="1" dirty="0" smtClean="0"/>
+              <a:rPr lang="it-IT" sz="1600" b="1" dirty="0"/>
               <a:t>Archivio di suoni </a:t>
             </a:r>
             <a:r>
-              <a:rPr lang="it-IT" sz="1600" dirty="0" smtClean="0"/>
+              <a:rPr lang="it-IT" sz="1600" dirty="0"/>
               <a:t>e </a:t>
             </a:r>
             <a:r>
-              <a:rPr lang="it-IT" sz="1600" b="1" dirty="0" smtClean="0"/>
+              <a:rPr lang="it-IT" sz="1600" b="1" dirty="0"/>
               <a:t>modelli</a:t>
             </a:r>
             <a:r>
-              <a:rPr lang="it-IT" sz="1600" dirty="0" smtClean="0"/>
+              <a:rPr lang="it-IT" sz="1600" dirty="0"/>
               <a:t>: rispettivamente effetti sonori e modelli tridimensionali che possiamo associare agli attori.</a:t>
             </a:r>
           </a:p>
@@ -5687,53 +6498,364 @@
               <a:buChar char="•"/>
             </a:pPr>
             <a:r>
-              <a:rPr lang="it-IT" sz="1600" b="1" dirty="0" smtClean="0"/>
+              <a:rPr lang="it-IT" sz="1600" b="1" dirty="0"/>
               <a:t>Controlli</a:t>
             </a:r>
             <a:r>
-              <a:rPr lang="it-IT" sz="1600" dirty="0" smtClean="0"/>
+              <a:rPr lang="it-IT" sz="1600" dirty="0"/>
               <a:t> per passare dalla modalità di realizzazione degli script (</a:t>
             </a:r>
             <a:r>
-              <a:rPr lang="it-IT" sz="1600" b="1" dirty="0" err="1" smtClean="0"/>
+              <a:rPr lang="it-IT" sz="1600" b="1" dirty="0" err="1"/>
               <a:t>Edit</a:t>
             </a:r>
             <a:r>
-              <a:rPr lang="it-IT" sz="1600" b="1" dirty="0" smtClean="0"/>
+              <a:rPr lang="it-IT" sz="1600" b="1" dirty="0"/>
               <a:t> mode</a:t>
             </a:r>
             <a:r>
-              <a:rPr lang="it-IT" sz="1600" dirty="0" smtClean="0"/>
+              <a:rPr lang="it-IT" sz="1600" dirty="0"/>
               <a:t>) a quella di esecuzione (</a:t>
             </a:r>
             <a:r>
-              <a:rPr lang="it-IT" sz="1600" b="1" dirty="0" smtClean="0"/>
+              <a:rPr lang="it-IT" sz="1600" b="1" dirty="0"/>
               <a:t>Play mode</a:t>
             </a:r>
             <a:r>
-              <a:rPr lang="it-IT" sz="1600" dirty="0" smtClean="0"/>
+              <a:rPr lang="it-IT" sz="1600" dirty="0"/>
               <a:t>) e viceversa.</a:t>
             </a:r>
-            <a:endParaRPr lang="it-IT" sz="1600" dirty="0"/>
           </a:p>
           <a:p>
             <a:pPr lvl="1">
               <a:buFont typeface="Arial" charset="0"/>
               <a:buChar char="•"/>
             </a:pPr>
-            <a:r>
-              <a:rPr lang="it-IT" sz="2000" dirty="0" smtClean="0"/>
+            <a:endParaRPr lang="it-IT" sz="2000" dirty="0"/>
+          </a:p>
+        </p:txBody>
+      </p:sp>
+      <p:pic>
+        <p:nvPicPr>
+          <p:cNvPr id="4" name="Picture 3">
+            <a:extLst>
+              <a:ext uri="{FF2B5EF4-FFF2-40B4-BE49-F238E27FC236}">
+                <a16:creationId xmlns:a16="http://schemas.microsoft.com/office/drawing/2014/main" id="{AC74FC69-6F3D-4C14-B9CF-119C0C734179}"/>
+              </a:ext>
+            </a:extLst>
+          </p:cNvPr>
+          <p:cNvPicPr>
+            <a:picLocks noChangeAspect="1"/>
+          </p:cNvPicPr>
+          <p:nvPr/>
+        </p:nvPicPr>
+        <p:blipFill>
+          <a:blip r:embed="rId2"/>
+          <a:stretch>
+            <a:fillRect/>
+          </a:stretch>
+        </p:blipFill>
+        <p:spPr>
+          <a:xfrm>
+            <a:off x="6366590" y="1845734"/>
+            <a:ext cx="2051968" cy="2245236"/>
+          </a:xfrm>
+          <a:prstGeom prst="rect">
+            <a:avLst/>
+          </a:prstGeom>
+        </p:spPr>
+      </p:pic>
+      <p:sp>
+        <p:nvSpPr>
+          <p:cNvPr id="5" name="Content Placeholder 2">
+            <a:extLst>
+              <a:ext uri="{FF2B5EF4-FFF2-40B4-BE49-F238E27FC236}">
+                <a16:creationId xmlns:a16="http://schemas.microsoft.com/office/drawing/2014/main" id="{C78165CF-4CF0-4A70-9E1C-8B856A512ACD}"/>
+              </a:ext>
+            </a:extLst>
+          </p:cNvPr>
+          <p:cNvSpPr txBox="1">
+            <a:spLocks/>
+          </p:cNvSpPr>
+          <p:nvPr/>
+        </p:nvSpPr>
+        <p:spPr>
+          <a:xfrm>
+            <a:off x="822960" y="4090970"/>
+            <a:ext cx="7543801" cy="4023360"/>
+          </a:xfrm>
+          <a:prstGeom prst="rect">
+            <a:avLst/>
+          </a:prstGeom>
+        </p:spPr>
+        <p:txBody>
+          <a:bodyPr vert="horz" lIns="0" tIns="45720" rIns="0" bIns="45720" rtlCol="0">
+            <a:normAutofit/>
+          </a:bodyPr>
+          <a:lstStyle>
+            <a:lvl1pPr marL="91440" indent="-91440" algn="l" defTabSz="914400" rtl="0" eaLnBrk="1" latinLnBrk="0" hangingPunct="1">
+              <a:lnSpc>
+                <a:spcPct val="90000"/>
+              </a:lnSpc>
+              <a:spcBef>
+                <a:spcPts val="1200"/>
+              </a:spcBef>
+              <a:spcAft>
+                <a:spcPts val="200"/>
+              </a:spcAft>
+              <a:buClr>
+                <a:schemeClr val="accent1"/>
+              </a:buClr>
+              <a:buSzPct val="100000"/>
+              <a:buFont typeface="Calibri" panose="020F0502020204030204" pitchFamily="34" charset="0"/>
+              <a:buChar char=" "/>
+              <a:defRPr sz="2000" kern="1200">
+                <a:solidFill>
+                  <a:schemeClr val="tx1">
+                    <a:lumMod val="75000"/>
+                    <a:lumOff val="25000"/>
+                  </a:schemeClr>
+                </a:solidFill>
+                <a:latin typeface="+mn-lt"/>
+                <a:ea typeface="+mn-ea"/>
+                <a:cs typeface="+mn-cs"/>
+              </a:defRPr>
+            </a:lvl1pPr>
+            <a:lvl2pPr marL="384048" indent="-182880" algn="l" defTabSz="914400" rtl="0" eaLnBrk="1" latinLnBrk="0" hangingPunct="1">
+              <a:lnSpc>
+                <a:spcPct val="90000"/>
+              </a:lnSpc>
+              <a:spcBef>
+                <a:spcPts val="200"/>
+              </a:spcBef>
+              <a:spcAft>
+                <a:spcPts val="400"/>
+              </a:spcAft>
+              <a:buClr>
+                <a:schemeClr val="accent1"/>
+              </a:buClr>
+              <a:buFont typeface="Calibri" pitchFamily="34" charset="0"/>
+              <a:buChar char="◦"/>
+              <a:defRPr sz="1800" kern="1200">
+                <a:solidFill>
+                  <a:schemeClr val="tx1">
+                    <a:lumMod val="75000"/>
+                    <a:lumOff val="25000"/>
+                  </a:schemeClr>
+                </a:solidFill>
+                <a:latin typeface="+mn-lt"/>
+                <a:ea typeface="+mn-ea"/>
+                <a:cs typeface="+mn-cs"/>
+              </a:defRPr>
+            </a:lvl2pPr>
+            <a:lvl3pPr marL="566928" indent="-182880" algn="l" defTabSz="914400" rtl="0" eaLnBrk="1" latinLnBrk="0" hangingPunct="1">
+              <a:lnSpc>
+                <a:spcPct val="90000"/>
+              </a:lnSpc>
+              <a:spcBef>
+                <a:spcPts val="200"/>
+              </a:spcBef>
+              <a:spcAft>
+                <a:spcPts val="400"/>
+              </a:spcAft>
+              <a:buClr>
+                <a:schemeClr val="accent1"/>
+              </a:buClr>
+              <a:buFont typeface="Calibri" pitchFamily="34" charset="0"/>
+              <a:buChar char="◦"/>
+              <a:defRPr sz="1400" kern="1200">
+                <a:solidFill>
+                  <a:schemeClr val="tx1">
+                    <a:lumMod val="75000"/>
+                    <a:lumOff val="25000"/>
+                  </a:schemeClr>
+                </a:solidFill>
+                <a:latin typeface="+mn-lt"/>
+                <a:ea typeface="+mn-ea"/>
+                <a:cs typeface="+mn-cs"/>
+              </a:defRPr>
+            </a:lvl3pPr>
+            <a:lvl4pPr marL="749808" indent="-182880" algn="l" defTabSz="914400" rtl="0" eaLnBrk="1" latinLnBrk="0" hangingPunct="1">
+              <a:lnSpc>
+                <a:spcPct val="90000"/>
+              </a:lnSpc>
+              <a:spcBef>
+                <a:spcPts val="200"/>
+              </a:spcBef>
+              <a:spcAft>
+                <a:spcPts val="400"/>
+              </a:spcAft>
+              <a:buClr>
+                <a:schemeClr val="accent1"/>
+              </a:buClr>
+              <a:buFont typeface="Calibri" pitchFamily="34" charset="0"/>
+              <a:buChar char="◦"/>
+              <a:defRPr sz="1400" kern="1200">
+                <a:solidFill>
+                  <a:schemeClr val="tx1">
+                    <a:lumMod val="75000"/>
+                    <a:lumOff val="25000"/>
+                  </a:schemeClr>
+                </a:solidFill>
+                <a:latin typeface="+mn-lt"/>
+                <a:ea typeface="+mn-ea"/>
+                <a:cs typeface="+mn-cs"/>
+              </a:defRPr>
+            </a:lvl4pPr>
+            <a:lvl5pPr marL="932688" indent="-182880" algn="l" defTabSz="914400" rtl="0" eaLnBrk="1" latinLnBrk="0" hangingPunct="1">
+              <a:lnSpc>
+                <a:spcPct val="90000"/>
+              </a:lnSpc>
+              <a:spcBef>
+                <a:spcPts val="200"/>
+              </a:spcBef>
+              <a:spcAft>
+                <a:spcPts val="400"/>
+              </a:spcAft>
+              <a:buClr>
+                <a:schemeClr val="accent1"/>
+              </a:buClr>
+              <a:buFont typeface="Calibri" pitchFamily="34" charset="0"/>
+              <a:buChar char="◦"/>
+              <a:defRPr sz="1400" kern="1200">
+                <a:solidFill>
+                  <a:schemeClr val="tx1">
+                    <a:lumMod val="75000"/>
+                    <a:lumOff val="25000"/>
+                  </a:schemeClr>
+                </a:solidFill>
+                <a:latin typeface="+mn-lt"/>
+                <a:ea typeface="+mn-ea"/>
+                <a:cs typeface="+mn-cs"/>
+              </a:defRPr>
+            </a:lvl5pPr>
+            <a:lvl6pPr marL="1100000" indent="-228600" algn="l" defTabSz="914400" rtl="0" eaLnBrk="1" latinLnBrk="0" hangingPunct="1">
+              <a:lnSpc>
+                <a:spcPct val="90000"/>
+              </a:lnSpc>
+              <a:spcBef>
+                <a:spcPts val="200"/>
+              </a:spcBef>
+              <a:spcAft>
+                <a:spcPts val="400"/>
+              </a:spcAft>
+              <a:buClr>
+                <a:schemeClr val="accent1"/>
+              </a:buClr>
+              <a:buFont typeface="Calibri" pitchFamily="34" charset="0"/>
+              <a:buChar char="◦"/>
+              <a:defRPr sz="1400" kern="1200">
+                <a:solidFill>
+                  <a:schemeClr val="tx1">
+                    <a:lumMod val="75000"/>
+                    <a:lumOff val="25000"/>
+                  </a:schemeClr>
+                </a:solidFill>
+                <a:latin typeface="+mn-lt"/>
+                <a:ea typeface="+mn-ea"/>
+                <a:cs typeface="+mn-cs"/>
+              </a:defRPr>
+            </a:lvl6pPr>
+            <a:lvl7pPr marL="1300000" indent="-228600" algn="l" defTabSz="914400" rtl="0" eaLnBrk="1" latinLnBrk="0" hangingPunct="1">
+              <a:lnSpc>
+                <a:spcPct val="90000"/>
+              </a:lnSpc>
+              <a:spcBef>
+                <a:spcPts val="200"/>
+              </a:spcBef>
+              <a:spcAft>
+                <a:spcPts val="400"/>
+              </a:spcAft>
+              <a:buClr>
+                <a:schemeClr val="accent1"/>
+              </a:buClr>
+              <a:buFont typeface="Calibri" pitchFamily="34" charset="0"/>
+              <a:buChar char="◦"/>
+              <a:defRPr sz="1400" kern="1200">
+                <a:solidFill>
+                  <a:schemeClr val="tx1">
+                    <a:lumMod val="75000"/>
+                    <a:lumOff val="25000"/>
+                  </a:schemeClr>
+                </a:solidFill>
+                <a:latin typeface="+mn-lt"/>
+                <a:ea typeface="+mn-ea"/>
+                <a:cs typeface="+mn-cs"/>
+              </a:defRPr>
+            </a:lvl7pPr>
+            <a:lvl8pPr marL="1500000" indent="-228600" algn="l" defTabSz="914400" rtl="0" eaLnBrk="1" latinLnBrk="0" hangingPunct="1">
+              <a:lnSpc>
+                <a:spcPct val="90000"/>
+              </a:lnSpc>
+              <a:spcBef>
+                <a:spcPts val="200"/>
+              </a:spcBef>
+              <a:spcAft>
+                <a:spcPts val="400"/>
+              </a:spcAft>
+              <a:buClr>
+                <a:schemeClr val="accent1"/>
+              </a:buClr>
+              <a:buFont typeface="Calibri" pitchFamily="34" charset="0"/>
+              <a:buChar char="◦"/>
+              <a:defRPr sz="1400" kern="1200">
+                <a:solidFill>
+                  <a:schemeClr val="tx1">
+                    <a:lumMod val="75000"/>
+                    <a:lumOff val="25000"/>
+                  </a:schemeClr>
+                </a:solidFill>
+                <a:latin typeface="+mn-lt"/>
+                <a:ea typeface="+mn-ea"/>
+                <a:cs typeface="+mn-cs"/>
+              </a:defRPr>
+            </a:lvl8pPr>
+            <a:lvl9pPr marL="1700000" indent="-228600" algn="l" defTabSz="914400" rtl="0" eaLnBrk="1" latinLnBrk="0" hangingPunct="1">
+              <a:lnSpc>
+                <a:spcPct val="90000"/>
+              </a:lnSpc>
+              <a:spcBef>
+                <a:spcPts val="200"/>
+              </a:spcBef>
+              <a:spcAft>
+                <a:spcPts val="400"/>
+              </a:spcAft>
+              <a:buClr>
+                <a:schemeClr val="accent1"/>
+              </a:buClr>
+              <a:buFont typeface="Calibri" pitchFamily="34" charset="0"/>
+              <a:buChar char="◦"/>
+              <a:defRPr sz="1400" kern="1200">
+                <a:solidFill>
+                  <a:schemeClr val="tx1">
+                    <a:lumMod val="75000"/>
+                    <a:lumOff val="25000"/>
+                  </a:schemeClr>
+                </a:solidFill>
+                <a:latin typeface="+mn-lt"/>
+                <a:ea typeface="+mn-ea"/>
+                <a:cs typeface="+mn-cs"/>
+              </a:defRPr>
+            </a:lvl9pPr>
+          </a:lstStyle>
+          <a:p>
+            <a:pPr lvl="1">
+              <a:buFont typeface="Arial" charset="0"/>
+              <a:buChar char="•"/>
+            </a:pPr>
+            <a:r>
+              <a:rPr lang="it-IT" sz="2000" dirty="0"/>
               <a:t>Ad ogni </a:t>
             </a:r>
             <a:r>
-              <a:rPr lang="it-IT" sz="2000" b="1" dirty="0" smtClean="0"/>
+              <a:rPr lang="it-IT" sz="2000" b="1" dirty="0"/>
               <a:t>Attore</a:t>
             </a:r>
             <a:r>
-              <a:rPr lang="it-IT" sz="2000" dirty="0" smtClean="0"/>
+              <a:rPr lang="it-IT" sz="2000" dirty="0"/>
               <a:t> sono associati</a:t>
             </a:r>
-            <a:endParaRPr lang="it-IT" sz="2000" b="1" dirty="0" smtClean="0"/>
+            <a:endParaRPr lang="it-IT" sz="2000" b="1" dirty="0"/>
           </a:p>
           <a:p>
             <a:pPr lvl="2">
@@ -5741,43 +6863,39 @@
               <a:buChar char="•"/>
             </a:pPr>
             <a:r>
-              <a:rPr lang="it-IT" sz="1600" dirty="0" smtClean="0"/>
+              <a:rPr lang="it-IT" sz="1600" dirty="0"/>
               <a:t>Una </a:t>
             </a:r>
             <a:r>
               <a:rPr lang="it-IT" sz="1600" b="1" dirty="0"/>
-              <a:t>p</a:t>
-            </a:r>
-            <a:r>
-              <a:rPr lang="it-IT" sz="1600" b="1" dirty="0" smtClean="0"/>
-              <a:t>osizione</a:t>
-            </a:r>
-            <a:r>
-              <a:rPr lang="it-IT" sz="1600" dirty="0" smtClean="0"/>
+              <a:t>posizione</a:t>
+            </a:r>
+            <a:r>
+              <a:rPr lang="it-IT" sz="1600" dirty="0"/>
               <a:t>, una </a:t>
             </a:r>
             <a:r>
-              <a:rPr lang="it-IT" sz="1600" b="1" dirty="0" smtClean="0"/>
+              <a:rPr lang="it-IT" sz="1600" b="1" dirty="0"/>
               <a:t>rotazione</a:t>
             </a:r>
             <a:r>
-              <a:rPr lang="it-IT" sz="1600" dirty="0" smtClean="0"/>
+              <a:rPr lang="it-IT" sz="1600" dirty="0"/>
               <a:t>, un </a:t>
             </a:r>
             <a:r>
-              <a:rPr lang="it-IT" sz="1600" b="1" dirty="0" smtClean="0"/>
+              <a:rPr lang="it-IT" sz="1600" b="1" dirty="0"/>
               <a:t>coefficiente di scala</a:t>
             </a:r>
             <a:r>
-              <a:rPr lang="it-IT" sz="1600" dirty="0" smtClean="0"/>
+              <a:rPr lang="it-IT" sz="1600" dirty="0"/>
               <a:t> e un valore di </a:t>
             </a:r>
             <a:r>
-              <a:rPr lang="it-IT" sz="1600" b="1" dirty="0" smtClean="0"/>
+              <a:rPr lang="it-IT" sz="1600" b="1" dirty="0"/>
               <a:t>volume sonoro</a:t>
             </a:r>
             <a:r>
-              <a:rPr lang="it-IT" sz="1600" dirty="0" smtClean="0"/>
+              <a:rPr lang="it-IT" sz="1600" dirty="0"/>
               <a:t>.</a:t>
             </a:r>
           </a:p>
@@ -5787,11 +6905,11 @@
               <a:buChar char="•"/>
             </a:pPr>
             <a:r>
-              <a:rPr lang="it-IT" sz="1600" b="1" dirty="0" smtClean="0"/>
+              <a:rPr lang="it-IT" sz="1600" b="1" dirty="0"/>
               <a:t>Script</a:t>
             </a:r>
             <a:r>
-              <a:rPr lang="it-IT" sz="1600" dirty="0" smtClean="0"/>
+              <a:rPr lang="it-IT" sz="1600" dirty="0"/>
               <a:t>: programmi realizzabili con l’apposita interfaccia.</a:t>
             </a:r>
           </a:p>
@@ -5801,15 +6919,15 @@
               <a:buChar char="•"/>
             </a:pPr>
             <a:r>
-              <a:rPr lang="it-IT" sz="1600" dirty="0" smtClean="0"/>
+              <a:rPr lang="it-IT" sz="1600" dirty="0"/>
               <a:t>Un</a:t>
             </a:r>
             <a:r>
-              <a:rPr lang="it-IT" sz="1600" b="1" dirty="0" smtClean="0"/>
+              <a:rPr lang="it-IT" sz="1600" b="1" dirty="0"/>
               <a:t> modello</a:t>
             </a:r>
             <a:r>
-              <a:rPr lang="it-IT" sz="1600" dirty="0" smtClean="0"/>
+              <a:rPr lang="it-IT" sz="1600" dirty="0"/>
               <a:t> tridimensionale che lo rappresenta.</a:t>
             </a:r>
           </a:p>
@@ -5819,15 +6937,15 @@
               <a:buChar char="•"/>
             </a:pPr>
             <a:r>
-              <a:rPr lang="it-IT" sz="1600" dirty="0" smtClean="0"/>
+              <a:rPr lang="it-IT" sz="1600" dirty="0"/>
               <a:t>Un </a:t>
             </a:r>
             <a:r>
-              <a:rPr lang="it-IT" sz="1600" b="1" dirty="0" smtClean="0"/>
+              <a:rPr lang="it-IT" sz="1600" b="1" dirty="0"/>
               <a:t>messaggio</a:t>
             </a:r>
             <a:r>
-              <a:rPr lang="it-IT" sz="1600" dirty="0" smtClean="0"/>
+              <a:rPr lang="it-IT" sz="1600" dirty="0"/>
               <a:t> che può essere usato per fare output.</a:t>
             </a:r>
           </a:p>
@@ -5836,7 +6954,7 @@
               <a:buFont typeface="Arial" charset="0"/>
               <a:buChar char="•"/>
             </a:pPr>
-            <a:endParaRPr lang="it-IT" sz="2000" dirty="0" smtClean="0"/>
+            <a:endParaRPr lang="it-IT" sz="2000" dirty="0"/>
           </a:p>
         </p:txBody>
       </p:sp>
@@ -5850,13 +6968,6 @@
   <p:clrMapOvr>
     <a:masterClrMapping/>
   </p:clrMapOvr>
-  <p:timing>
-    <p:tnLst>
-      <p:par>
-        <p:cTn id="1" dur="indefinite" restart="never" nodeType="tmRoot"/>
-      </p:par>
-    </p:tnLst>
-  </p:timing>
 </p:sld>
 </file>
 
@@ -5893,10 +7004,9 @@
           <a:lstStyle/>
           <a:p>
             <a:r>
-              <a:rPr lang="en-US" dirty="0" err="1" smtClean="0"/>
+              <a:rPr lang="it-IT" dirty="0"/>
               <a:t>Sintassi</a:t>
             </a:r>
-            <a:endParaRPr lang="en-US" dirty="0"/>
           </a:p>
         </p:txBody>
       </p:sp>
@@ -6173,15 +7283,15 @@
               <a:buChar char="•"/>
             </a:pPr>
             <a:r>
-              <a:rPr lang="it-IT" sz="2000" dirty="0" smtClean="0"/>
+              <a:rPr lang="it-IT" sz="2000" dirty="0"/>
               <a:t>Gli </a:t>
             </a:r>
             <a:r>
-              <a:rPr lang="it-IT" sz="2000" b="1" dirty="0" smtClean="0"/>
+              <a:rPr lang="it-IT" sz="2000" b="1" dirty="0"/>
               <a:t>script</a:t>
             </a:r>
             <a:r>
-              <a:rPr lang="it-IT" sz="2000" dirty="0" smtClean="0"/>
+              <a:rPr lang="it-IT" sz="2000" dirty="0"/>
               <a:t> sono composti dagli elementi seguenti:</a:t>
             </a:r>
           </a:p>
@@ -6191,11 +7301,11 @@
               <a:buChar char="•"/>
             </a:pPr>
             <a:r>
-              <a:rPr lang="it-IT" sz="1600" b="1" dirty="0" smtClean="0"/>
+              <a:rPr lang="it-IT" sz="1600" b="1" dirty="0"/>
               <a:t>Blocchi semplici</a:t>
             </a:r>
             <a:r>
-              <a:rPr lang="it-IT" sz="1600" dirty="0" smtClean="0"/>
+              <a:rPr lang="it-IT" sz="1600" dirty="0"/>
               <a:t>, che contengono una sola istruzione.</a:t>
             </a:r>
           </a:p>
@@ -6205,39 +7315,39 @@
               <a:buChar char="•"/>
             </a:pPr>
             <a:r>
-              <a:rPr lang="it-IT" sz="1600" b="1" dirty="0" smtClean="0"/>
+              <a:rPr lang="it-IT" sz="1600" b="1" dirty="0"/>
               <a:t>Blocchi di controllo</a:t>
             </a:r>
             <a:r>
-              <a:rPr lang="it-IT" sz="1600" dirty="0" smtClean="0"/>
+              <a:rPr lang="it-IT" sz="1600" dirty="0"/>
               <a:t>, usati per le strutture di controllo (</a:t>
             </a:r>
             <a:r>
-              <a:rPr lang="it-IT" sz="1600" i="1" dirty="0" err="1" smtClean="0"/>
+              <a:rPr lang="it-IT" sz="1600" i="1" dirty="0" err="1"/>
               <a:t>if</a:t>
             </a:r>
             <a:r>
-              <a:rPr lang="it-IT" sz="1600" i="1" dirty="0" smtClean="0"/>
+              <a:rPr lang="it-IT" sz="1600" i="1" dirty="0"/>
               <a:t>, </a:t>
             </a:r>
             <a:r>
-              <a:rPr lang="it-IT" sz="1600" i="1" dirty="0" err="1" smtClean="0"/>
+              <a:rPr lang="it-IT" sz="1600" i="1" dirty="0" err="1"/>
               <a:t>while</a:t>
             </a:r>
             <a:r>
-              <a:rPr lang="it-IT" sz="1600" i="1" dirty="0" smtClean="0"/>
+              <a:rPr lang="it-IT" sz="1600" i="1" dirty="0"/>
               <a:t>, …</a:t>
             </a:r>
             <a:r>
-              <a:rPr lang="it-IT" sz="1600" dirty="0" smtClean="0"/>
+              <a:rPr lang="it-IT" sz="1600" dirty="0"/>
               <a:t>). Presentano una </a:t>
             </a:r>
             <a:r>
-              <a:rPr lang="it-IT" sz="1600" i="1" dirty="0" smtClean="0"/>
+              <a:rPr lang="it-IT" sz="1600" i="1" dirty="0"/>
               <a:t>bocca</a:t>
             </a:r>
             <a:r>
-              <a:rPr lang="it-IT" sz="1600" dirty="0" smtClean="0"/>
+              <a:rPr lang="it-IT" sz="1600" dirty="0"/>
               <a:t> in cui è possibile inserire una sequenza di blocchi aggiuntiva.</a:t>
             </a:r>
           </a:p>
@@ -6247,27 +7357,27 @@
               <a:buChar char="•"/>
             </a:pPr>
             <a:r>
-              <a:rPr lang="it-IT" sz="1600" b="1" dirty="0" smtClean="0"/>
+              <a:rPr lang="it-IT" sz="1600" b="1" dirty="0"/>
               <a:t>Blocchi di controllo doppi</a:t>
             </a:r>
             <a:r>
-              <a:rPr lang="it-IT" sz="1600" dirty="0" smtClean="0"/>
+              <a:rPr lang="it-IT" sz="1600" dirty="0"/>
               <a:t>, usati per la struttura di controllo </a:t>
             </a:r>
             <a:r>
-              <a:rPr lang="it-IT" sz="1600" dirty="0" err="1" smtClean="0"/>
+              <a:rPr lang="it-IT" sz="1600" dirty="0" err="1"/>
               <a:t>if</a:t>
             </a:r>
             <a:r>
-              <a:rPr lang="it-IT" sz="1600" dirty="0" smtClean="0"/>
+              <a:rPr lang="it-IT" sz="1600" dirty="0"/>
               <a:t>/else. Presentano due </a:t>
             </a:r>
             <a:r>
-              <a:rPr lang="it-IT" sz="1600" i="1" dirty="0" smtClean="0"/>
+              <a:rPr lang="it-IT" sz="1600" i="1" dirty="0"/>
               <a:t>bocche</a:t>
             </a:r>
             <a:r>
-              <a:rPr lang="it-IT" sz="1600" dirty="0" smtClean="0"/>
+              <a:rPr lang="it-IT" sz="1600" dirty="0"/>
               <a:t> per l’inserimento di sequenze di blocchi aggiuntive.</a:t>
             </a:r>
           </a:p>
@@ -6277,11 +7387,11 @@
               <a:buChar char="•"/>
             </a:pPr>
             <a:r>
-              <a:rPr lang="it-IT" sz="1600" b="1" dirty="0" smtClean="0"/>
+              <a:rPr lang="it-IT" sz="1600" b="1" dirty="0"/>
               <a:t>Cappelli</a:t>
             </a:r>
             <a:r>
-              <a:rPr lang="it-IT" sz="1600" dirty="0" smtClean="0"/>
+              <a:rPr lang="it-IT" sz="1600" dirty="0"/>
               <a:t>, elementi aprono gli script e ne contengono la condizione di esecuzione.</a:t>
             </a:r>
           </a:p>
@@ -6290,10 +7400,130 @@
               <a:buFont typeface="Arial" charset="0"/>
               <a:buChar char="•"/>
             </a:pPr>
-            <a:endParaRPr lang="it-IT" sz="2000" dirty="0" smtClean="0"/>
-          </a:p>
-        </p:txBody>
-      </p:sp>
+            <a:endParaRPr lang="it-IT" sz="2000" dirty="0"/>
+          </a:p>
+        </p:txBody>
+      </p:sp>
+      <p:pic>
+        <p:nvPicPr>
+          <p:cNvPr id="4" name="Picture 3">
+            <a:extLst>
+              <a:ext uri="{FF2B5EF4-FFF2-40B4-BE49-F238E27FC236}">
+                <a16:creationId xmlns:a16="http://schemas.microsoft.com/office/drawing/2014/main" id="{D111CB8C-271D-42F3-B6A0-E4F5200B69E5}"/>
+              </a:ext>
+            </a:extLst>
+          </p:cNvPr>
+          <p:cNvPicPr>
+            <a:picLocks noChangeAspect="1"/>
+          </p:cNvPicPr>
+          <p:nvPr/>
+        </p:nvPicPr>
+        <p:blipFill>
+          <a:blip r:embed="rId2"/>
+          <a:stretch>
+            <a:fillRect/>
+          </a:stretch>
+        </p:blipFill>
+        <p:spPr>
+          <a:xfrm>
+            <a:off x="1407729" y="4609938"/>
+            <a:ext cx="2051968" cy="339258"/>
+          </a:xfrm>
+          <a:prstGeom prst="rect">
+            <a:avLst/>
+          </a:prstGeom>
+        </p:spPr>
+      </p:pic>
+      <p:pic>
+        <p:nvPicPr>
+          <p:cNvPr id="5" name="Picture 4">
+            <a:extLst>
+              <a:ext uri="{FF2B5EF4-FFF2-40B4-BE49-F238E27FC236}">
+                <a16:creationId xmlns:a16="http://schemas.microsoft.com/office/drawing/2014/main" id="{66061DD8-9274-4BCC-A359-3B073076BAC7}"/>
+              </a:ext>
+            </a:extLst>
+          </p:cNvPr>
+          <p:cNvPicPr>
+            <a:picLocks noChangeAspect="1"/>
+          </p:cNvPicPr>
+          <p:nvPr/>
+        </p:nvPicPr>
+        <p:blipFill>
+          <a:blip r:embed="rId3"/>
+          <a:stretch>
+            <a:fillRect/>
+          </a:stretch>
+        </p:blipFill>
+        <p:spPr>
+          <a:xfrm>
+            <a:off x="3720105" y="4097496"/>
+            <a:ext cx="2051968" cy="1024884"/>
+          </a:xfrm>
+          <a:prstGeom prst="rect">
+            <a:avLst/>
+          </a:prstGeom>
+        </p:spPr>
+      </p:pic>
+      <p:pic>
+        <p:nvPicPr>
+          <p:cNvPr id="6" name="Picture 5">
+            <a:extLst>
+              <a:ext uri="{FF2B5EF4-FFF2-40B4-BE49-F238E27FC236}">
+                <a16:creationId xmlns:a16="http://schemas.microsoft.com/office/drawing/2014/main" id="{4AEAB2D9-0C4A-45AB-8C15-6CD1C21B7D19}"/>
+              </a:ext>
+            </a:extLst>
+          </p:cNvPr>
+          <p:cNvPicPr>
+            <a:picLocks noChangeAspect="1"/>
+          </p:cNvPicPr>
+          <p:nvPr/>
+        </p:nvPicPr>
+        <p:blipFill>
+          <a:blip r:embed="rId4"/>
+          <a:stretch>
+            <a:fillRect/>
+          </a:stretch>
+        </p:blipFill>
+        <p:spPr>
+          <a:xfrm>
+            <a:off x="6201730" y="3857414"/>
+            <a:ext cx="1924488" cy="2245236"/>
+          </a:xfrm>
+          <a:prstGeom prst="rect">
+            <a:avLst/>
+          </a:prstGeom>
+        </p:spPr>
+      </p:pic>
+      <p:pic>
+        <p:nvPicPr>
+          <p:cNvPr id="7" name="Picture 6">
+            <a:extLst>
+              <a:ext uri="{FF2B5EF4-FFF2-40B4-BE49-F238E27FC236}">
+                <a16:creationId xmlns:a16="http://schemas.microsoft.com/office/drawing/2014/main" id="{D4D85FF8-4D70-4F55-98D0-C7E2EF955436}"/>
+              </a:ext>
+            </a:extLst>
+          </p:cNvPr>
+          <p:cNvPicPr>
+            <a:picLocks noChangeAspect="1"/>
+          </p:cNvPicPr>
+          <p:nvPr/>
+        </p:nvPicPr>
+        <p:blipFill>
+          <a:blip r:embed="rId5"/>
+          <a:stretch>
+            <a:fillRect/>
+          </a:stretch>
+        </p:blipFill>
+        <p:spPr>
+          <a:xfrm>
+            <a:off x="5772073" y="865464"/>
+            <a:ext cx="1225751" cy="2245236"/>
+          </a:xfrm>
+          <a:prstGeom prst="rect">
+            <a:avLst/>
+          </a:prstGeom>
+        </p:spPr>
+      </p:pic>
     </p:spTree>
     <p:extLst>
       <p:ext uri="{BB962C8B-B14F-4D97-AF65-F5344CB8AC3E}">
@@ -6304,13 +7534,6 @@
   <p:clrMapOvr>
     <a:masterClrMapping/>
   </p:clrMapOvr>
-  <p:timing>
-    <p:tnLst>
-      <p:par>
-        <p:cTn id="1" dur="indefinite" restart="never" nodeType="tmRoot"/>
-      </p:par>
-    </p:tnLst>
-  </p:timing>
 </p:sld>
 </file>
 
@@ -6347,7 +7570,7 @@
           <a:lstStyle/>
           <a:p>
             <a:r>
-              <a:rPr lang="en-US" dirty="0" err="1" smtClean="0"/>
+              <a:rPr lang="en-US" dirty="0" err="1"/>
               <a:t>Sintassi</a:t>
             </a:r>
             <a:endParaRPr lang="en-US" dirty="0"/>
@@ -6627,23 +7850,23 @@
               <a:buChar char="•"/>
             </a:pPr>
             <a:r>
-              <a:rPr lang="it-IT" sz="2000" dirty="0" smtClean="0"/>
+              <a:rPr lang="it-IT" sz="2000" dirty="0"/>
               <a:t>Alcuni blocchi presentano </a:t>
             </a:r>
             <a:r>
-              <a:rPr lang="it-IT" sz="2000" b="1" dirty="0" smtClean="0"/>
+              <a:rPr lang="it-IT" sz="2000" b="1" dirty="0"/>
               <a:t>caselle</a:t>
             </a:r>
             <a:r>
-              <a:rPr lang="it-IT" sz="2000" dirty="0" smtClean="0"/>
+              <a:rPr lang="it-IT" sz="2000" dirty="0"/>
               <a:t> in cui possono essere inseriti </a:t>
             </a:r>
             <a:r>
-              <a:rPr lang="it-IT" sz="2000" b="1" dirty="0" smtClean="0"/>
+              <a:rPr lang="it-IT" sz="2000" b="1" dirty="0"/>
               <a:t>operandi</a:t>
             </a:r>
             <a:r>
-              <a:rPr lang="it-IT" sz="2000" dirty="0" smtClean="0"/>
+              <a:rPr lang="it-IT" sz="2000" dirty="0"/>
               <a:t>.</a:t>
             </a:r>
           </a:p>
@@ -6653,23 +7876,23 @@
               <a:buChar char="•"/>
             </a:pPr>
             <a:r>
-              <a:rPr lang="it-IT" sz="1600" dirty="0" smtClean="0"/>
+              <a:rPr lang="it-IT" sz="1600" dirty="0"/>
               <a:t>Un operando è una </a:t>
             </a:r>
             <a:r>
-              <a:rPr lang="it-IT" sz="1600" b="1" dirty="0" smtClean="0"/>
+              <a:rPr lang="it-IT" sz="1600" b="1" dirty="0"/>
               <a:t>variabile</a:t>
             </a:r>
             <a:r>
-              <a:rPr lang="it-IT" sz="1600" dirty="0" smtClean="0"/>
+              <a:rPr lang="it-IT" sz="1600" dirty="0"/>
               <a:t> o una </a:t>
             </a:r>
             <a:r>
-              <a:rPr lang="it-IT" sz="1600" b="1" dirty="0" smtClean="0"/>
+              <a:rPr lang="it-IT" sz="1600" b="1" dirty="0"/>
               <a:t>espressione</a:t>
             </a:r>
             <a:r>
-              <a:rPr lang="it-IT" sz="1600" dirty="0" smtClean="0"/>
+              <a:rPr lang="it-IT" sz="1600" dirty="0"/>
               <a:t> di altri operandi.</a:t>
             </a:r>
           </a:p>
@@ -6679,39 +7902,39 @@
               <a:buChar char="•"/>
             </a:pPr>
             <a:r>
-              <a:rPr lang="it-IT" sz="1600" dirty="0" smtClean="0"/>
+              <a:rPr lang="it-IT" sz="1600" dirty="0"/>
               <a:t>Un operando è sempre associato ad un </a:t>
             </a:r>
             <a:r>
-              <a:rPr lang="it-IT" sz="1600" b="1" dirty="0" smtClean="0"/>
+              <a:rPr lang="it-IT" sz="1600" b="1" dirty="0"/>
               <a:t>tipo </a:t>
             </a:r>
             <a:r>
-              <a:rPr lang="it-IT" sz="1600" dirty="0" smtClean="0"/>
+              <a:rPr lang="it-IT" sz="1600" dirty="0"/>
               <a:t>tra </a:t>
             </a:r>
             <a:r>
-              <a:rPr lang="it-IT" sz="1600" b="1" dirty="0" smtClean="0"/>
+              <a:rPr lang="it-IT" sz="1600" b="1" dirty="0"/>
               <a:t>stringa</a:t>
             </a:r>
             <a:r>
-              <a:rPr lang="it-IT" sz="1600" dirty="0" smtClean="0"/>
+              <a:rPr lang="it-IT" sz="1600" dirty="0"/>
               <a:t>, </a:t>
             </a:r>
             <a:r>
-              <a:rPr lang="it-IT" sz="1600" b="1" dirty="0" smtClean="0"/>
+              <a:rPr lang="it-IT" sz="1600" b="1" dirty="0"/>
               <a:t>numero</a:t>
             </a:r>
             <a:r>
-              <a:rPr lang="it-IT" sz="1600" dirty="0" smtClean="0"/>
+              <a:rPr lang="it-IT" sz="1600" dirty="0"/>
               <a:t> e </a:t>
             </a:r>
             <a:r>
-              <a:rPr lang="it-IT" sz="1600" b="1" dirty="0" smtClean="0"/>
+              <a:rPr lang="it-IT" sz="1600" b="1" dirty="0"/>
               <a:t>booleano</a:t>
             </a:r>
             <a:r>
-              <a:rPr lang="it-IT" sz="1600" dirty="0" smtClean="0"/>
+              <a:rPr lang="it-IT" sz="1600" dirty="0"/>
               <a:t>. In una casella in cui si richiede un operando di tipo stringa, è possibile usare anche operandi di tipo numero e booleano.</a:t>
             </a:r>
           </a:p>
@@ -6721,15 +7944,15 @@
               <a:buChar char="•"/>
             </a:pPr>
             <a:r>
-              <a:rPr lang="it-IT" sz="2000" dirty="0" smtClean="0"/>
+              <a:rPr lang="it-IT" sz="2000" dirty="0"/>
               <a:t>Alcuni blocchi presentano </a:t>
             </a:r>
             <a:r>
-              <a:rPr lang="it-IT" sz="2000" b="1" dirty="0" smtClean="0"/>
+              <a:rPr lang="it-IT" sz="2000" b="1" dirty="0"/>
               <a:t>opzioni</a:t>
             </a:r>
             <a:r>
-              <a:rPr lang="it-IT" sz="2000" dirty="0" smtClean="0"/>
+              <a:rPr lang="it-IT" sz="2000" dirty="0"/>
               <a:t>: caselle con menù a tendina per la selezione di un valore in un elenco prestabilito.</a:t>
             </a:r>
           </a:p>
@@ -6739,23 +7962,23 @@
               <a:buChar char="•"/>
             </a:pPr>
             <a:r>
-              <a:rPr lang="it-IT" sz="2000" dirty="0" smtClean="0"/>
+              <a:rPr lang="it-IT" sz="2000" dirty="0"/>
               <a:t>Le </a:t>
             </a:r>
             <a:r>
-              <a:rPr lang="it-IT" sz="2000" b="1" dirty="0" smtClean="0"/>
+              <a:rPr lang="it-IT" sz="2000" b="1" dirty="0"/>
               <a:t>variabili</a:t>
             </a:r>
             <a:r>
-              <a:rPr lang="it-IT" sz="2000" dirty="0" smtClean="0"/>
+              <a:rPr lang="it-IT" sz="2000" dirty="0"/>
               <a:t> si definiscono con i controlli dell’ambiente di programmazione (separatamente rispetto agli script), ma sono disponibili istruzioni per </a:t>
             </a:r>
             <a:r>
-              <a:rPr lang="it-IT" sz="2000" b="1" dirty="0" smtClean="0"/>
+              <a:rPr lang="it-IT" sz="2000" b="1" dirty="0"/>
               <a:t>assegnare loro valori diversi</a:t>
             </a:r>
             <a:r>
-              <a:rPr lang="it-IT" sz="2000" dirty="0" smtClean="0"/>
+              <a:rPr lang="it-IT" sz="2000" dirty="0"/>
               <a:t>.</a:t>
             </a:r>
           </a:p>
@@ -6764,17 +7987,137 @@
               <a:buFont typeface="Arial" charset="0"/>
               <a:buChar char="•"/>
             </a:pPr>
-            <a:endParaRPr lang="it-IT" sz="1600" dirty="0" smtClean="0"/>
+            <a:endParaRPr lang="it-IT" sz="1600" dirty="0"/>
           </a:p>
           <a:p>
             <a:pPr lvl="1">
               <a:buFont typeface="Arial" charset="0"/>
               <a:buChar char="•"/>
             </a:pPr>
-            <a:endParaRPr lang="it-IT" sz="2000" dirty="0" smtClean="0"/>
-          </a:p>
-        </p:txBody>
-      </p:sp>
+            <a:endParaRPr lang="it-IT" sz="2000" dirty="0"/>
+          </a:p>
+        </p:txBody>
+      </p:sp>
+      <p:pic>
+        <p:nvPicPr>
+          <p:cNvPr id="4" name="Picture 3">
+            <a:extLst>
+              <a:ext uri="{FF2B5EF4-FFF2-40B4-BE49-F238E27FC236}">
+                <a16:creationId xmlns:a16="http://schemas.microsoft.com/office/drawing/2014/main" id="{38F858C8-CCFD-45A5-B7B4-E10FE11C7154}"/>
+              </a:ext>
+            </a:extLst>
+          </p:cNvPr>
+          <p:cNvPicPr>
+            <a:picLocks noChangeAspect="1"/>
+          </p:cNvPicPr>
+          <p:nvPr/>
+        </p:nvPicPr>
+        <p:blipFill>
+          <a:blip r:embed="rId2"/>
+          <a:stretch>
+            <a:fillRect/>
+          </a:stretch>
+        </p:blipFill>
+        <p:spPr>
+          <a:xfrm>
+            <a:off x="5886373" y="1845734"/>
+            <a:ext cx="2552086" cy="556753"/>
+          </a:xfrm>
+          <a:prstGeom prst="rect">
+            <a:avLst/>
+          </a:prstGeom>
+        </p:spPr>
+      </p:pic>
+      <p:pic>
+        <p:nvPicPr>
+          <p:cNvPr id="5" name="Picture 4">
+            <a:extLst>
+              <a:ext uri="{FF2B5EF4-FFF2-40B4-BE49-F238E27FC236}">
+                <a16:creationId xmlns:a16="http://schemas.microsoft.com/office/drawing/2014/main" id="{152E0B30-0345-4BA7-8733-F3C89055DAFC}"/>
+              </a:ext>
+            </a:extLst>
+          </p:cNvPr>
+          <p:cNvPicPr>
+            <a:picLocks noChangeAspect="1"/>
+          </p:cNvPicPr>
+          <p:nvPr/>
+        </p:nvPicPr>
+        <p:blipFill>
+          <a:blip r:embed="rId3"/>
+          <a:stretch>
+            <a:fillRect/>
+          </a:stretch>
+        </p:blipFill>
+        <p:spPr>
+          <a:xfrm>
+            <a:off x="6998581" y="2913911"/>
+            <a:ext cx="1439878" cy="556753"/>
+          </a:xfrm>
+          <a:prstGeom prst="rect">
+            <a:avLst/>
+          </a:prstGeom>
+        </p:spPr>
+      </p:pic>
+      <p:pic>
+        <p:nvPicPr>
+          <p:cNvPr id="6" name="Picture 5">
+            <a:extLst>
+              <a:ext uri="{FF2B5EF4-FFF2-40B4-BE49-F238E27FC236}">
+                <a16:creationId xmlns:a16="http://schemas.microsoft.com/office/drawing/2014/main" id="{40927989-E2DB-4B99-9EFB-950ED9DAD904}"/>
+              </a:ext>
+            </a:extLst>
+          </p:cNvPr>
+          <p:cNvPicPr>
+            <a:picLocks noChangeAspect="1"/>
+          </p:cNvPicPr>
+          <p:nvPr/>
+        </p:nvPicPr>
+        <p:blipFill>
+          <a:blip r:embed="rId4"/>
+          <a:stretch>
+            <a:fillRect/>
+          </a:stretch>
+        </p:blipFill>
+        <p:spPr>
+          <a:xfrm>
+            <a:off x="5591656" y="2913911"/>
+            <a:ext cx="1059188" cy="556753"/>
+          </a:xfrm>
+          <a:prstGeom prst="rect">
+            <a:avLst/>
+          </a:prstGeom>
+        </p:spPr>
+      </p:pic>
+      <p:pic>
+        <p:nvPicPr>
+          <p:cNvPr id="7" name="Picture 6">
+            <a:extLst>
+              <a:ext uri="{FF2B5EF4-FFF2-40B4-BE49-F238E27FC236}">
+                <a16:creationId xmlns:a16="http://schemas.microsoft.com/office/drawing/2014/main" id="{D735BB8A-B15B-4C12-B9AC-7649B0BD045B}"/>
+              </a:ext>
+            </a:extLst>
+          </p:cNvPr>
+          <p:cNvPicPr>
+            <a:picLocks noChangeAspect="1"/>
+          </p:cNvPicPr>
+          <p:nvPr/>
+        </p:nvPicPr>
+        <p:blipFill>
+          <a:blip r:embed="rId5"/>
+          <a:stretch>
+            <a:fillRect/>
+          </a:stretch>
+        </p:blipFill>
+        <p:spPr>
+          <a:xfrm>
+            <a:off x="5347109" y="4349401"/>
+            <a:ext cx="3054724" cy="1556872"/>
+          </a:xfrm>
+          <a:prstGeom prst="rect">
+            <a:avLst/>
+          </a:prstGeom>
+        </p:spPr>
+      </p:pic>
     </p:spTree>
     <p:extLst>
       <p:ext uri="{BB962C8B-B14F-4D97-AF65-F5344CB8AC3E}">
@@ -6785,13 +8128,6 @@
   <p:clrMapOvr>
     <a:masterClrMapping/>
   </p:clrMapOvr>
-  <p:timing>
-    <p:tnLst>
-      <p:par>
-        <p:cTn id="1" dur="indefinite" restart="never" nodeType="tmRoot"/>
-      </p:par>
-    </p:tnLst>
-  </p:timing>
 </p:sld>
 </file>
 
@@ -6828,7 +8164,7 @@
           <a:lstStyle/>
           <a:p>
             <a:r>
-              <a:rPr lang="en-US" dirty="0" err="1" smtClean="0"/>
+              <a:rPr lang="en-US" dirty="0" err="1"/>
               <a:t>Semantica</a:t>
             </a:r>
             <a:endParaRPr lang="en-US" dirty="0"/>
@@ -7108,23 +8444,23 @@
               <a:buChar char="•"/>
             </a:pPr>
             <a:r>
-              <a:rPr lang="it-IT" sz="2000" dirty="0" smtClean="0"/>
+              <a:rPr lang="it-IT" sz="2000" dirty="0"/>
               <a:t>Ciascun </a:t>
             </a:r>
             <a:r>
-              <a:rPr lang="it-IT" sz="2000" b="1" dirty="0" smtClean="0"/>
+              <a:rPr lang="it-IT" sz="2000" b="1" dirty="0"/>
               <a:t>attore</a:t>
             </a:r>
             <a:r>
-              <a:rPr lang="it-IT" sz="2000" dirty="0" smtClean="0"/>
+              <a:rPr lang="it-IT" sz="2000" dirty="0"/>
               <a:t> definisce </a:t>
             </a:r>
             <a:r>
-              <a:rPr lang="it-IT" sz="2000" b="1" dirty="0" smtClean="0"/>
+              <a:rPr lang="it-IT" sz="2000" b="1" dirty="0"/>
               <a:t>variabili locali</a:t>
             </a:r>
             <a:r>
-              <a:rPr lang="it-IT" sz="2000" dirty="0" smtClean="0"/>
+              <a:rPr lang="it-IT" sz="2000" dirty="0"/>
               <a:t> su cui ha visibilità esclusiva.</a:t>
             </a:r>
           </a:p>
@@ -7134,15 +8470,15 @@
               <a:buChar char="•"/>
             </a:pPr>
             <a:r>
-              <a:rPr lang="it-IT" sz="2000" dirty="0" smtClean="0"/>
+              <a:rPr lang="it-IT" sz="2000" dirty="0"/>
               <a:t>Sono definibili </a:t>
             </a:r>
             <a:r>
-              <a:rPr lang="it-IT" sz="2000" b="1" dirty="0" smtClean="0"/>
+              <a:rPr lang="it-IT" sz="2000" b="1" dirty="0"/>
               <a:t>variabili globali</a:t>
             </a:r>
             <a:r>
-              <a:rPr lang="it-IT" sz="2000" dirty="0" smtClean="0"/>
+              <a:rPr lang="it-IT" sz="2000" dirty="0"/>
               <a:t> che risultano visibili per qualsiasi attore.</a:t>
             </a:r>
           </a:p>
@@ -7152,23 +8488,23 @@
               <a:buChar char="•"/>
             </a:pPr>
             <a:r>
-              <a:rPr lang="it-IT" sz="2000" dirty="0" smtClean="0"/>
+              <a:rPr lang="it-IT" sz="2000" dirty="0"/>
               <a:t>Un attore può </a:t>
             </a:r>
             <a:r>
-              <a:rPr lang="it-IT" sz="2000" b="1" dirty="0" smtClean="0"/>
+              <a:rPr lang="it-IT" sz="2000" b="1" dirty="0"/>
               <a:t>trasmettere in broadcast un messaggio</a:t>
             </a:r>
             <a:r>
-              <a:rPr lang="it-IT" sz="2000" dirty="0" smtClean="0"/>
+              <a:rPr lang="it-IT" sz="2000" dirty="0"/>
               <a:t> che contiene una stringa, scatenando l’esecuzione di script che comincino con l’</a:t>
             </a:r>
             <a:r>
-              <a:rPr lang="it-IT" sz="2000" b="1" dirty="0" smtClean="0"/>
+              <a:rPr lang="it-IT" sz="2000" b="1" dirty="0"/>
               <a:t>opportuno cappello di ricezione</a:t>
             </a:r>
             <a:r>
-              <a:rPr lang="it-IT" sz="2000" dirty="0" smtClean="0"/>
+              <a:rPr lang="it-IT" sz="2000" dirty="0"/>
               <a:t>.</a:t>
             </a:r>
           </a:p>
@@ -7178,14 +8514,14 @@
               <a:buChar char="•"/>
             </a:pPr>
             <a:r>
-              <a:rPr lang="it-IT" sz="1600" dirty="0" smtClean="0"/>
+              <a:rPr lang="it-IT" sz="1600" dirty="0"/>
               <a:t>È possibile sfruttare questo meccanismo per la simulazione di chiamate a </a:t>
             </a:r>
             <a:r>
-              <a:rPr lang="it-IT" sz="1600" smtClean="0"/>
+              <a:rPr lang="it-IT" sz="1600"/>
               <a:t>funzione.</a:t>
             </a:r>
-            <a:endParaRPr lang="it-IT" sz="1600" dirty="0" smtClean="0"/>
+            <a:endParaRPr lang="it-IT" sz="1600" dirty="0"/>
           </a:p>
         </p:txBody>
       </p:sp>
@@ -7199,13 +8535,6 @@
   <p:clrMapOvr>
     <a:masterClrMapping/>
   </p:clrMapOvr>
-  <p:timing>
-    <p:tnLst>
-      <p:par>
-        <p:cTn id="1" dur="indefinite" restart="never" nodeType="tmRoot"/>
-      </p:par>
-    </p:tnLst>
-  </p:timing>
 </p:sld>
 </file>
 
@@ -7242,15 +8571,15 @@
           <a:lstStyle/>
           <a:p>
             <a:r>
-              <a:rPr lang="en-US" dirty="0" err="1" smtClean="0"/>
+              <a:rPr lang="en-US" dirty="0" err="1"/>
               <a:t>Grammatica</a:t>
             </a:r>
             <a:r>
-              <a:rPr lang="en-US" dirty="0" smtClean="0"/>
+              <a:rPr lang="en-US" dirty="0"/>
               <a:t> </a:t>
             </a:r>
             <a:r>
-              <a:rPr lang="en-US" dirty="0" err="1" smtClean="0"/>
+              <a:rPr lang="en-US" dirty="0" err="1"/>
               <a:t>visuale</a:t>
             </a:r>
             <a:endParaRPr lang="en-US" dirty="0"/>
@@ -7267,13 +8596,6 @@
   <p:clrMapOvr>
     <a:masterClrMapping/>
   </p:clrMapOvr>
-  <p:timing>
-    <p:tnLst>
-      <p:par>
-        <p:cTn id="1" dur="indefinite" restart="never" nodeType="tmRoot"/>
-      </p:par>
-    </p:tnLst>
-  </p:timing>
 </p:sld>
 </file>
 
@@ -7310,15 +8632,15 @@
           <a:lstStyle/>
           <a:p>
             <a:r>
-              <a:rPr lang="en-US" dirty="0" err="1" smtClean="0"/>
+              <a:rPr lang="en-US" dirty="0" err="1"/>
               <a:t>Motore</a:t>
             </a:r>
             <a:r>
-              <a:rPr lang="en-US" dirty="0" smtClean="0"/>
+              <a:rPr lang="en-US" dirty="0"/>
               <a:t> di </a:t>
             </a:r>
             <a:r>
-              <a:rPr lang="en-US" dirty="0" err="1" smtClean="0"/>
+              <a:rPr lang="en-US" dirty="0" err="1"/>
               <a:t>Valutazione</a:t>
             </a:r>
             <a:endParaRPr lang="en-US" dirty="0"/>

</xml_diff>

<commit_message>
Finire di implementare fattoriale iterativo, implementare movimento con controller
</commit_message>
<xml_diff>
--- a/Presentazione.pptx
+++ b/Presentazione.pptx
@@ -20265,19 +20265,11 @@
             </a:pPr>
             <a:r>
               <a:rPr lang="it-IT" sz="2000" dirty="0"/>
-              <a:t>Esempio di sfruttamento del sistema di messaggistica per il calcolo del fattoriale (</a:t>
-            </a:r>
-            <a:r>
-              <a:rPr lang="it-IT" sz="2000" dirty="0" err="1"/>
-              <a:t>tail</a:t>
-            </a:r>
-            <a:r>
-              <a:rPr lang="it-IT" sz="2000" dirty="0"/>
-              <a:t>-ricorsivo: non si supporta il passaggio </a:t>
+              <a:t>Esempio di sfruttamento del sistema di messaggistica per il calcolo del fattoriale (iterativo: non si supporta la creazione di </a:t>
             </a:r>
             <a:r>
               <a:rPr lang="it-IT" sz="2000"/>
-              <a:t>di argomenti).</a:t>
+              <a:t>nuovi record di allocazione).</a:t>
             </a:r>
             <a:endParaRPr lang="it-IT" sz="2000" dirty="0"/>
           </a:p>

</xml_diff>